<commit_message>
2022.08.16 java study-note final
</commit_message>
<xml_diff>
--- a/study-note/자바/2022-08-16 내용정리.pptx
+++ b/study-note/자바/2022-08-16 내용정리.pptx
@@ -5,7 +5,7 @@
     <p:sldMasterId id="2147483648" r:id="rId1"/>
   </p:sldMasterIdLst>
   <p:notesMasterIdLst>
-    <p:notesMasterId r:id="rId12"/>
+    <p:notesMasterId r:id="rId13"/>
   </p:notesMasterIdLst>
   <p:sldIdLst>
     <p:sldId id="256" r:id="rId2"/>
@@ -17,7 +17,8 @@
     <p:sldId id="297" r:id="rId8"/>
     <p:sldId id="301" r:id="rId9"/>
     <p:sldId id="298" r:id="rId10"/>
-    <p:sldId id="299" r:id="rId11"/>
+    <p:sldId id="302" r:id="rId11"/>
+    <p:sldId id="299" r:id="rId12"/>
   </p:sldIdLst>
   <p:sldSz cx="12192000" cy="6858000"/>
   <p:notesSz cx="6858000" cy="9144000"/>
@@ -209,7 +210,7 @@
           <a:p>
             <a:fld id="{F526C2EA-361D-406E-8534-6CB21787882E}" type="datetimeFigureOut">
               <a:rPr lang="ko-KR" altLang="en-US" smtClean="0"/>
-              <a:t>2022. 8. 16.</a:t>
+              <a:t>2022. 8. 17.</a:t>
             </a:fld>
             <a:endParaRPr lang="ko-KR" altLang="en-US"/>
           </a:p>
@@ -623,7 +624,7 @@
           <a:p>
             <a:fld id="{E429DD96-549C-4464-A555-B392FBD40474}" type="datetimeFigureOut">
               <a:rPr lang="ko-KR" altLang="en-US" smtClean="0"/>
-              <a:t>2022. 8. 16.</a:t>
+              <a:t>2022. 8. 17.</a:t>
             </a:fld>
             <a:endParaRPr lang="ko-KR" altLang="en-US"/>
           </a:p>
@@ -821,7 +822,7 @@
           <a:p>
             <a:fld id="{E429DD96-549C-4464-A555-B392FBD40474}" type="datetimeFigureOut">
               <a:rPr lang="ko-KR" altLang="en-US" smtClean="0"/>
-              <a:t>2022. 8. 16.</a:t>
+              <a:t>2022. 8. 17.</a:t>
             </a:fld>
             <a:endParaRPr lang="ko-KR" altLang="en-US"/>
           </a:p>
@@ -1029,7 +1030,7 @@
           <a:p>
             <a:fld id="{E429DD96-549C-4464-A555-B392FBD40474}" type="datetimeFigureOut">
               <a:rPr lang="ko-KR" altLang="en-US" smtClean="0"/>
-              <a:t>2022. 8. 16.</a:t>
+              <a:t>2022. 8. 17.</a:t>
             </a:fld>
             <a:endParaRPr lang="ko-KR" altLang="en-US"/>
           </a:p>
@@ -1227,7 +1228,7 @@
           <a:p>
             <a:fld id="{E429DD96-549C-4464-A555-B392FBD40474}" type="datetimeFigureOut">
               <a:rPr lang="ko-KR" altLang="en-US" smtClean="0"/>
-              <a:t>2022. 8. 16.</a:t>
+              <a:t>2022. 8. 17.</a:t>
             </a:fld>
             <a:endParaRPr lang="ko-KR" altLang="en-US"/>
           </a:p>
@@ -1502,7 +1503,7 @@
           <a:p>
             <a:fld id="{E429DD96-549C-4464-A555-B392FBD40474}" type="datetimeFigureOut">
               <a:rPr lang="ko-KR" altLang="en-US" smtClean="0"/>
-              <a:t>2022. 8. 16.</a:t>
+              <a:t>2022. 8. 17.</a:t>
             </a:fld>
             <a:endParaRPr lang="ko-KR" altLang="en-US"/>
           </a:p>
@@ -1767,7 +1768,7 @@
           <a:p>
             <a:fld id="{E429DD96-549C-4464-A555-B392FBD40474}" type="datetimeFigureOut">
               <a:rPr lang="ko-KR" altLang="en-US" smtClean="0"/>
-              <a:t>2022. 8. 16.</a:t>
+              <a:t>2022. 8. 17.</a:t>
             </a:fld>
             <a:endParaRPr lang="ko-KR" altLang="en-US"/>
           </a:p>
@@ -2179,7 +2180,7 @@
           <a:p>
             <a:fld id="{E429DD96-549C-4464-A555-B392FBD40474}" type="datetimeFigureOut">
               <a:rPr lang="ko-KR" altLang="en-US" smtClean="0"/>
-              <a:t>2022. 8. 16.</a:t>
+              <a:t>2022. 8. 17.</a:t>
             </a:fld>
             <a:endParaRPr lang="ko-KR" altLang="en-US"/>
           </a:p>
@@ -2320,7 +2321,7 @@
           <a:p>
             <a:fld id="{E429DD96-549C-4464-A555-B392FBD40474}" type="datetimeFigureOut">
               <a:rPr lang="ko-KR" altLang="en-US" smtClean="0"/>
-              <a:t>2022. 8. 16.</a:t>
+              <a:t>2022. 8. 17.</a:t>
             </a:fld>
             <a:endParaRPr lang="ko-KR" altLang="en-US"/>
           </a:p>
@@ -2433,7 +2434,7 @@
           <a:p>
             <a:fld id="{E429DD96-549C-4464-A555-B392FBD40474}" type="datetimeFigureOut">
               <a:rPr lang="ko-KR" altLang="en-US" smtClean="0"/>
-              <a:t>2022. 8. 16.</a:t>
+              <a:t>2022. 8. 17.</a:t>
             </a:fld>
             <a:endParaRPr lang="ko-KR" altLang="en-US"/>
           </a:p>
@@ -2744,7 +2745,7 @@
           <a:p>
             <a:fld id="{E429DD96-549C-4464-A555-B392FBD40474}" type="datetimeFigureOut">
               <a:rPr lang="ko-KR" altLang="en-US" smtClean="0"/>
-              <a:t>2022. 8. 16.</a:t>
+              <a:t>2022. 8. 17.</a:t>
             </a:fld>
             <a:endParaRPr lang="ko-KR" altLang="en-US"/>
           </a:p>
@@ -3032,7 +3033,7 @@
           <a:p>
             <a:fld id="{E429DD96-549C-4464-A555-B392FBD40474}" type="datetimeFigureOut">
               <a:rPr lang="ko-KR" altLang="en-US" smtClean="0"/>
-              <a:t>2022. 8. 16.</a:t>
+              <a:t>2022. 8. 17.</a:t>
             </a:fld>
             <a:endParaRPr lang="ko-KR" altLang="en-US"/>
           </a:p>
@@ -3273,7 +3274,7 @@
           <a:p>
             <a:fld id="{E429DD96-549C-4464-A555-B392FBD40474}" type="datetimeFigureOut">
               <a:rPr lang="ko-KR" altLang="en-US" smtClean="0"/>
-              <a:t>2022. 8. 16.</a:t>
+              <a:t>2022. 8. 17.</a:t>
             </a:fld>
             <a:endParaRPr lang="ko-KR" altLang="en-US"/>
           </a:p>
@@ -3777,6 +3778,2170 @@
           <a:chExt cx="0" cy="0"/>
         </a:xfrm>
       </p:grpSpPr>
+      <p:sp>
+        <p:nvSpPr>
+          <p:cNvPr id="2" name="웃는 얼굴[S] 1">
+            <a:extLst>
+              <a:ext uri="{FF2B5EF4-FFF2-40B4-BE49-F238E27FC236}">
+                <a16:creationId xmlns:a16="http://schemas.microsoft.com/office/drawing/2014/main" id="{AE9BF1FB-FB59-97C2-3858-9DBDA32C5716}"/>
+              </a:ext>
+            </a:extLst>
+          </p:cNvPr>
+          <p:cNvSpPr/>
+          <p:nvPr/>
+        </p:nvSpPr>
+        <p:spPr>
+          <a:xfrm>
+            <a:off x="1408387" y="2144110"/>
+            <a:ext cx="1156138" cy="1156138"/>
+          </a:xfrm>
+          <a:prstGeom prst="smileyFace">
+            <a:avLst/>
+          </a:prstGeom>
+        </p:spPr>
+        <p:style>
+          <a:lnRef idx="3">
+            <a:schemeClr val="lt1"/>
+          </a:lnRef>
+          <a:fillRef idx="1">
+            <a:schemeClr val="accent4"/>
+          </a:fillRef>
+          <a:effectRef idx="1">
+            <a:schemeClr val="accent4"/>
+          </a:effectRef>
+          <a:fontRef idx="minor">
+            <a:schemeClr val="lt1"/>
+          </a:fontRef>
+        </p:style>
+        <p:txBody>
+          <a:bodyPr rtlCol="0" anchor="ctr"/>
+          <a:lstStyle/>
+          <a:p>
+            <a:pPr algn="ctr"/>
+            <a:endParaRPr kumimoji="1" lang="ko-Kore-KR" altLang="en-US"/>
+          </a:p>
+        </p:txBody>
+      </p:sp>
+      <p:sp>
+        <p:nvSpPr>
+          <p:cNvPr id="3" name="직사각형 2">
+            <a:extLst>
+              <a:ext uri="{FF2B5EF4-FFF2-40B4-BE49-F238E27FC236}">
+                <a16:creationId xmlns:a16="http://schemas.microsoft.com/office/drawing/2014/main" id="{6D83A14A-3449-A152-F500-71C8EA8382CE}"/>
+              </a:ext>
+            </a:extLst>
+          </p:cNvPr>
+          <p:cNvSpPr/>
+          <p:nvPr/>
+        </p:nvSpPr>
+        <p:spPr>
+          <a:xfrm>
+            <a:off x="4897821" y="2102069"/>
+            <a:ext cx="1198179" cy="1198179"/>
+          </a:xfrm>
+          <a:prstGeom prst="rect">
+            <a:avLst/>
+          </a:prstGeom>
+        </p:spPr>
+        <p:style>
+          <a:lnRef idx="3">
+            <a:schemeClr val="lt1"/>
+          </a:lnRef>
+          <a:fillRef idx="1">
+            <a:schemeClr val="accent5"/>
+          </a:fillRef>
+          <a:effectRef idx="1">
+            <a:schemeClr val="accent5"/>
+          </a:effectRef>
+          <a:fontRef idx="minor">
+            <a:schemeClr val="lt1"/>
+          </a:fontRef>
+        </p:style>
+        <p:txBody>
+          <a:bodyPr rtlCol="0" anchor="ctr"/>
+          <a:lstStyle/>
+          <a:p>
+            <a:pPr algn="ctr"/>
+            <a:r>
+              <a:rPr kumimoji="1" lang="en-US" altLang="ko-Kore-KR" dirty="0"/>
+              <a:t>UI</a:t>
+            </a:r>
+            <a:endParaRPr kumimoji="1" lang="ko-Kore-KR" altLang="en-US" dirty="0"/>
+          </a:p>
+        </p:txBody>
+      </p:sp>
+      <p:sp>
+        <p:nvSpPr>
+          <p:cNvPr id="4" name="직사각형 3">
+            <a:extLst>
+              <a:ext uri="{FF2B5EF4-FFF2-40B4-BE49-F238E27FC236}">
+                <a16:creationId xmlns:a16="http://schemas.microsoft.com/office/drawing/2014/main" id="{9EC9956D-AA72-79D3-BBBB-65A6D9E8F888}"/>
+              </a:ext>
+            </a:extLst>
+          </p:cNvPr>
+          <p:cNvSpPr/>
+          <p:nvPr/>
+        </p:nvSpPr>
+        <p:spPr>
+          <a:xfrm>
+            <a:off x="8598608" y="2102068"/>
+            <a:ext cx="1198179" cy="1198179"/>
+          </a:xfrm>
+          <a:prstGeom prst="rect">
+            <a:avLst/>
+          </a:prstGeom>
+        </p:spPr>
+        <p:style>
+          <a:lnRef idx="3">
+            <a:schemeClr val="lt1"/>
+          </a:lnRef>
+          <a:fillRef idx="1">
+            <a:schemeClr val="accent3"/>
+          </a:fillRef>
+          <a:effectRef idx="1">
+            <a:schemeClr val="accent3"/>
+          </a:effectRef>
+          <a:fontRef idx="minor">
+            <a:schemeClr val="lt1"/>
+          </a:fontRef>
+        </p:style>
+        <p:txBody>
+          <a:bodyPr rtlCol="0" anchor="ctr"/>
+          <a:lstStyle/>
+          <a:p>
+            <a:pPr algn="ctr"/>
+            <a:r>
+              <a:rPr kumimoji="1" lang="en-US" altLang="ko-Kore-KR" dirty="0"/>
+              <a:t>Server</a:t>
+            </a:r>
+            <a:endParaRPr kumimoji="1" lang="ko-Kore-KR" altLang="en-US" dirty="0"/>
+          </a:p>
+        </p:txBody>
+      </p:sp>
+      <p:cxnSp>
+        <p:nvCxnSpPr>
+          <p:cNvPr id="6" name="구부러진 연결선[U] 5">
+            <a:extLst>
+              <a:ext uri="{FF2B5EF4-FFF2-40B4-BE49-F238E27FC236}">
+                <a16:creationId xmlns:a16="http://schemas.microsoft.com/office/drawing/2014/main" id="{C92F48CE-4B31-10C8-D19E-CDA7C6F5EBC6}"/>
+              </a:ext>
+            </a:extLst>
+          </p:cNvPr>
+          <p:cNvCxnSpPr>
+            <a:stCxn id="2" idx="7"/>
+            <a:endCxn id="3" idx="0"/>
+          </p:cNvCxnSpPr>
+          <p:nvPr/>
+        </p:nvCxnSpPr>
+        <p:spPr>
+          <a:xfrm rot="5400000" flipH="1" flipV="1">
+            <a:off x="3840386" y="656897"/>
+            <a:ext cx="211353" cy="3101698"/>
+          </a:xfrm>
+          <a:prstGeom prst="curvedConnector3">
+            <a:avLst>
+              <a:gd name="adj1" fmla="val 208160"/>
+            </a:avLst>
+          </a:prstGeom>
+          <a:ln>
+            <a:tailEnd type="triangle"/>
+          </a:ln>
+        </p:spPr>
+        <p:style>
+          <a:lnRef idx="3">
+            <a:schemeClr val="accent5"/>
+          </a:lnRef>
+          <a:fillRef idx="0">
+            <a:schemeClr val="accent5"/>
+          </a:fillRef>
+          <a:effectRef idx="2">
+            <a:schemeClr val="accent5"/>
+          </a:effectRef>
+          <a:fontRef idx="minor">
+            <a:schemeClr val="tx1"/>
+          </a:fontRef>
+        </p:style>
+      </p:cxnSp>
+      <p:cxnSp>
+        <p:nvCxnSpPr>
+          <p:cNvPr id="7" name="구부러진 연결선[U] 6">
+            <a:extLst>
+              <a:ext uri="{FF2B5EF4-FFF2-40B4-BE49-F238E27FC236}">
+                <a16:creationId xmlns:a16="http://schemas.microsoft.com/office/drawing/2014/main" id="{5D566BC6-3FAB-6838-DE63-2A7E373807BC}"/>
+              </a:ext>
+            </a:extLst>
+          </p:cNvPr>
+          <p:cNvCxnSpPr>
+            <a:cxnSpLocks/>
+            <a:stCxn id="3" idx="0"/>
+            <a:endCxn id="4" idx="0"/>
+          </p:cNvCxnSpPr>
+          <p:nvPr/>
+        </p:nvCxnSpPr>
+        <p:spPr>
+          <a:xfrm rot="5400000" flipH="1" flipV="1">
+            <a:off x="7347304" y="251676"/>
+            <a:ext cx="1" cy="3700787"/>
+          </a:xfrm>
+          <a:prstGeom prst="curvedConnector3">
+            <a:avLst>
+              <a:gd name="adj1" fmla="val 22860100000"/>
+            </a:avLst>
+          </a:prstGeom>
+          <a:ln>
+            <a:tailEnd type="triangle"/>
+          </a:ln>
+        </p:spPr>
+        <p:style>
+          <a:lnRef idx="3">
+            <a:schemeClr val="accent5"/>
+          </a:lnRef>
+          <a:fillRef idx="0">
+            <a:schemeClr val="accent5"/>
+          </a:fillRef>
+          <a:effectRef idx="2">
+            <a:schemeClr val="accent5"/>
+          </a:effectRef>
+          <a:fontRef idx="minor">
+            <a:schemeClr val="tx1"/>
+          </a:fontRef>
+        </p:style>
+      </p:cxnSp>
+      <p:cxnSp>
+        <p:nvCxnSpPr>
+          <p:cNvPr id="11" name="구부러진 연결선[U] 10">
+            <a:extLst>
+              <a:ext uri="{FF2B5EF4-FFF2-40B4-BE49-F238E27FC236}">
+                <a16:creationId xmlns:a16="http://schemas.microsoft.com/office/drawing/2014/main" id="{8E0BB055-0277-919E-926F-E71DF0BD3920}"/>
+              </a:ext>
+            </a:extLst>
+          </p:cNvPr>
+          <p:cNvCxnSpPr>
+            <a:cxnSpLocks/>
+            <a:stCxn id="4" idx="2"/>
+            <a:endCxn id="3" idx="2"/>
+          </p:cNvCxnSpPr>
+          <p:nvPr/>
+        </p:nvCxnSpPr>
+        <p:spPr>
+          <a:xfrm rot="5400000">
+            <a:off x="7347305" y="1449854"/>
+            <a:ext cx="1" cy="3700787"/>
+          </a:xfrm>
+          <a:prstGeom prst="curvedConnector3">
+            <a:avLst>
+              <a:gd name="adj1" fmla="val 22860100000"/>
+            </a:avLst>
+          </a:prstGeom>
+          <a:ln>
+            <a:tailEnd type="triangle"/>
+          </a:ln>
+        </p:spPr>
+        <p:style>
+          <a:lnRef idx="3">
+            <a:schemeClr val="accent3"/>
+          </a:lnRef>
+          <a:fillRef idx="0">
+            <a:schemeClr val="accent3"/>
+          </a:fillRef>
+          <a:effectRef idx="2">
+            <a:schemeClr val="accent3"/>
+          </a:effectRef>
+          <a:fontRef idx="minor">
+            <a:schemeClr val="tx1"/>
+          </a:fontRef>
+        </p:style>
+      </p:cxnSp>
+      <p:cxnSp>
+        <p:nvCxnSpPr>
+          <p:cNvPr id="14" name="구부러진 연결선[U] 13">
+            <a:extLst>
+              <a:ext uri="{FF2B5EF4-FFF2-40B4-BE49-F238E27FC236}">
+                <a16:creationId xmlns:a16="http://schemas.microsoft.com/office/drawing/2014/main" id="{48DB4429-D7DD-92CB-7385-AC9F59757685}"/>
+              </a:ext>
+            </a:extLst>
+          </p:cNvPr>
+          <p:cNvCxnSpPr>
+            <a:cxnSpLocks/>
+            <a:stCxn id="3" idx="2"/>
+            <a:endCxn id="2" idx="5"/>
+          </p:cNvCxnSpPr>
+          <p:nvPr/>
+        </p:nvCxnSpPr>
+        <p:spPr>
+          <a:xfrm rot="5400000" flipH="1">
+            <a:off x="3861406" y="1664743"/>
+            <a:ext cx="169312" cy="3101698"/>
+          </a:xfrm>
+          <a:prstGeom prst="curvedConnector3">
+            <a:avLst>
+              <a:gd name="adj1" fmla="val -135017"/>
+            </a:avLst>
+          </a:prstGeom>
+          <a:ln>
+            <a:tailEnd type="triangle"/>
+          </a:ln>
+        </p:spPr>
+        <p:style>
+          <a:lnRef idx="3">
+            <a:schemeClr val="accent3"/>
+          </a:lnRef>
+          <a:fillRef idx="0">
+            <a:schemeClr val="accent3"/>
+          </a:fillRef>
+          <a:effectRef idx="2">
+            <a:schemeClr val="accent3"/>
+          </a:effectRef>
+          <a:fontRef idx="minor">
+            <a:schemeClr val="tx1"/>
+          </a:fontRef>
+        </p:style>
+      </p:cxnSp>
+      <p:sp>
+        <p:nvSpPr>
+          <p:cNvPr id="17" name="TextBox 16">
+            <a:extLst>
+              <a:ext uri="{FF2B5EF4-FFF2-40B4-BE49-F238E27FC236}">
+                <a16:creationId xmlns:a16="http://schemas.microsoft.com/office/drawing/2014/main" id="{8614C75F-927D-3FCC-51CC-CE03131A1219}"/>
+              </a:ext>
+            </a:extLst>
+          </p:cNvPr>
+          <p:cNvSpPr txBox="1"/>
+          <p:nvPr/>
+        </p:nvSpPr>
+        <p:spPr>
+          <a:xfrm>
+            <a:off x="3584647" y="1679824"/>
+            <a:ext cx="722830" cy="307777"/>
+          </a:xfrm>
+          <a:prstGeom prst="rect">
+            <a:avLst/>
+          </a:prstGeom>
+        </p:spPr>
+        <p:style>
+          <a:lnRef idx="2">
+            <a:schemeClr val="accent5"/>
+          </a:lnRef>
+          <a:fillRef idx="1">
+            <a:schemeClr val="lt1"/>
+          </a:fillRef>
+          <a:effectRef idx="0">
+            <a:schemeClr val="accent5"/>
+          </a:effectRef>
+          <a:fontRef idx="minor">
+            <a:schemeClr val="dk1"/>
+          </a:fontRef>
+        </p:style>
+        <p:txBody>
+          <a:bodyPr wrap="square" rtlCol="0">
+            <a:spAutoFit/>
+          </a:bodyPr>
+          <a:lstStyle/>
+          <a:p>
+            <a:pPr algn="ctr"/>
+            <a:r>
+              <a:rPr kumimoji="1" lang="ko-KR" altLang="en-US" sz="1400" dirty="0"/>
+              <a:t>입력</a:t>
+            </a:r>
+            <a:endParaRPr kumimoji="1" lang="ko-Kore-KR" altLang="en-US" sz="1400" dirty="0"/>
+          </a:p>
+        </p:txBody>
+      </p:sp>
+      <p:sp>
+        <p:nvSpPr>
+          <p:cNvPr id="19" name="TextBox 18">
+            <a:extLst>
+              <a:ext uri="{FF2B5EF4-FFF2-40B4-BE49-F238E27FC236}">
+                <a16:creationId xmlns:a16="http://schemas.microsoft.com/office/drawing/2014/main" id="{A8BBB682-7057-9E83-E7C3-37BDCFB94D2A}"/>
+              </a:ext>
+            </a:extLst>
+          </p:cNvPr>
+          <p:cNvSpPr txBox="1"/>
+          <p:nvPr/>
+        </p:nvSpPr>
+        <p:spPr>
+          <a:xfrm>
+            <a:off x="6985889" y="1679824"/>
+            <a:ext cx="722830" cy="307777"/>
+          </a:xfrm>
+          <a:prstGeom prst="rect">
+            <a:avLst/>
+          </a:prstGeom>
+        </p:spPr>
+        <p:style>
+          <a:lnRef idx="2">
+            <a:schemeClr val="accent5"/>
+          </a:lnRef>
+          <a:fillRef idx="1">
+            <a:schemeClr val="lt1"/>
+          </a:fillRef>
+          <a:effectRef idx="0">
+            <a:schemeClr val="accent5"/>
+          </a:effectRef>
+          <a:fontRef idx="minor">
+            <a:schemeClr val="dk1"/>
+          </a:fontRef>
+        </p:style>
+        <p:txBody>
+          <a:bodyPr wrap="square" rtlCol="0">
+            <a:spAutoFit/>
+          </a:bodyPr>
+          <a:lstStyle/>
+          <a:p>
+            <a:pPr algn="ctr"/>
+            <a:r>
+              <a:rPr kumimoji="1" lang="ko-KR" altLang="en-US" sz="1400" dirty="0"/>
+              <a:t>요청</a:t>
+            </a:r>
+            <a:endParaRPr kumimoji="1" lang="ko-Kore-KR" altLang="en-US" sz="1400" dirty="0"/>
+          </a:p>
+        </p:txBody>
+      </p:sp>
+      <p:sp>
+        <p:nvSpPr>
+          <p:cNvPr id="20" name="TextBox 19">
+            <a:extLst>
+              <a:ext uri="{FF2B5EF4-FFF2-40B4-BE49-F238E27FC236}">
+                <a16:creationId xmlns:a16="http://schemas.microsoft.com/office/drawing/2014/main" id="{2316D7C8-9AF2-5D9A-C39E-AF2960E6CF01}"/>
+              </a:ext>
+            </a:extLst>
+          </p:cNvPr>
+          <p:cNvSpPr txBox="1"/>
+          <p:nvPr/>
+        </p:nvSpPr>
+        <p:spPr>
+          <a:xfrm>
+            <a:off x="3584647" y="3403863"/>
+            <a:ext cx="722830" cy="307777"/>
+          </a:xfrm>
+          <a:prstGeom prst="rect">
+            <a:avLst/>
+          </a:prstGeom>
+        </p:spPr>
+        <p:style>
+          <a:lnRef idx="2">
+            <a:schemeClr val="accent3"/>
+          </a:lnRef>
+          <a:fillRef idx="1">
+            <a:schemeClr val="lt1"/>
+          </a:fillRef>
+          <a:effectRef idx="0">
+            <a:schemeClr val="accent3"/>
+          </a:effectRef>
+          <a:fontRef idx="minor">
+            <a:schemeClr val="dk1"/>
+          </a:fontRef>
+        </p:style>
+        <p:txBody>
+          <a:bodyPr wrap="square" rtlCol="0">
+            <a:spAutoFit/>
+          </a:bodyPr>
+          <a:lstStyle/>
+          <a:p>
+            <a:pPr algn="ctr"/>
+            <a:r>
+              <a:rPr kumimoji="1" lang="ko-KR" altLang="en-US" sz="1400" dirty="0"/>
+              <a:t>출력</a:t>
+            </a:r>
+            <a:endParaRPr kumimoji="1" lang="ko-Kore-KR" altLang="en-US" sz="1400" dirty="0"/>
+          </a:p>
+        </p:txBody>
+      </p:sp>
+      <p:sp>
+        <p:nvSpPr>
+          <p:cNvPr id="21" name="TextBox 20">
+            <a:extLst>
+              <a:ext uri="{FF2B5EF4-FFF2-40B4-BE49-F238E27FC236}">
+                <a16:creationId xmlns:a16="http://schemas.microsoft.com/office/drawing/2014/main" id="{0CEA22C1-9BB3-A4B1-8C27-9876ACBEFBC8}"/>
+              </a:ext>
+            </a:extLst>
+          </p:cNvPr>
+          <p:cNvSpPr txBox="1"/>
+          <p:nvPr/>
+        </p:nvSpPr>
+        <p:spPr>
+          <a:xfrm>
+            <a:off x="6985889" y="3403862"/>
+            <a:ext cx="722830" cy="307777"/>
+          </a:xfrm>
+          <a:prstGeom prst="rect">
+            <a:avLst/>
+          </a:prstGeom>
+        </p:spPr>
+        <p:style>
+          <a:lnRef idx="2">
+            <a:schemeClr val="accent3"/>
+          </a:lnRef>
+          <a:fillRef idx="1">
+            <a:schemeClr val="lt1"/>
+          </a:fillRef>
+          <a:effectRef idx="0">
+            <a:schemeClr val="accent3"/>
+          </a:effectRef>
+          <a:fontRef idx="minor">
+            <a:schemeClr val="dk1"/>
+          </a:fontRef>
+        </p:style>
+        <p:txBody>
+          <a:bodyPr wrap="square" rtlCol="0">
+            <a:spAutoFit/>
+          </a:bodyPr>
+          <a:lstStyle/>
+          <a:p>
+            <a:pPr algn="ctr"/>
+            <a:r>
+              <a:rPr kumimoji="1" lang="ko-KR" altLang="en-US" sz="1400" dirty="0"/>
+              <a:t>응답</a:t>
+            </a:r>
+            <a:endParaRPr kumimoji="1" lang="ko-Kore-KR" altLang="en-US" sz="1400" dirty="0"/>
+          </a:p>
+        </p:txBody>
+      </p:sp>
+    </p:spTree>
+    <p:extLst>
+      <p:ext uri="{BB962C8B-B14F-4D97-AF65-F5344CB8AC3E}">
+        <p14:creationId xmlns:p14="http://schemas.microsoft.com/office/powerpoint/2010/main" val="550871897"/>
+      </p:ext>
+    </p:extLst>
+  </p:cSld>
+  <p:clrMapOvr>
+    <a:masterClrMapping/>
+  </p:clrMapOvr>
+</p:sld>
+</file>
+
+<file path=ppt/slides/slide11.xml><?xml version="1.0" encoding="utf-8"?>
+<p:sld xmlns:a="http://schemas.openxmlformats.org/drawingml/2006/main" xmlns:r="http://schemas.openxmlformats.org/officeDocument/2006/relationships" xmlns:p="http://schemas.openxmlformats.org/presentationml/2006/main">
+  <p:cSld>
+    <p:spTree>
+      <p:nvGrpSpPr>
+        <p:cNvPr id="1" name=""/>
+        <p:cNvGrpSpPr/>
+        <p:nvPr/>
+      </p:nvGrpSpPr>
+      <p:grpSpPr>
+        <a:xfrm>
+          <a:off x="0" y="0"/>
+          <a:ext cx="0" cy="0"/>
+          <a:chOff x="0" y="0"/>
+          <a:chExt cx="0" cy="0"/>
+        </a:xfrm>
+      </p:grpSpPr>
+      <p:sp>
+        <p:nvSpPr>
+          <p:cNvPr id="2" name="웃는 얼굴[S] 1">
+            <a:extLst>
+              <a:ext uri="{FF2B5EF4-FFF2-40B4-BE49-F238E27FC236}">
+                <a16:creationId xmlns:a16="http://schemas.microsoft.com/office/drawing/2014/main" id="{0BE201EA-C29B-9D91-3371-6FEE1D6A8025}"/>
+              </a:ext>
+            </a:extLst>
+          </p:cNvPr>
+          <p:cNvSpPr/>
+          <p:nvPr/>
+        </p:nvSpPr>
+        <p:spPr>
+          <a:xfrm>
+            <a:off x="0" y="1655781"/>
+            <a:ext cx="1156138" cy="1156138"/>
+          </a:xfrm>
+          <a:prstGeom prst="smileyFace">
+            <a:avLst/>
+          </a:prstGeom>
+        </p:spPr>
+        <p:style>
+          <a:lnRef idx="3">
+            <a:schemeClr val="lt1"/>
+          </a:lnRef>
+          <a:fillRef idx="1">
+            <a:schemeClr val="accent4"/>
+          </a:fillRef>
+          <a:effectRef idx="1">
+            <a:schemeClr val="accent4"/>
+          </a:effectRef>
+          <a:fontRef idx="minor">
+            <a:schemeClr val="lt1"/>
+          </a:fontRef>
+        </p:style>
+        <p:txBody>
+          <a:bodyPr rtlCol="0" anchor="ctr"/>
+          <a:lstStyle/>
+          <a:p>
+            <a:pPr algn="ctr"/>
+            <a:endParaRPr kumimoji="1" lang="ko-Kore-KR" altLang="en-US"/>
+          </a:p>
+        </p:txBody>
+      </p:sp>
+      <p:sp>
+        <p:nvSpPr>
+          <p:cNvPr id="3" name="직사각형 2">
+            <a:extLst>
+              <a:ext uri="{FF2B5EF4-FFF2-40B4-BE49-F238E27FC236}">
+                <a16:creationId xmlns:a16="http://schemas.microsoft.com/office/drawing/2014/main" id="{8176E1DF-CB61-4081-D9CD-CECF382544F2}"/>
+              </a:ext>
+            </a:extLst>
+          </p:cNvPr>
+          <p:cNvSpPr/>
+          <p:nvPr/>
+        </p:nvSpPr>
+        <p:spPr>
+          <a:xfrm>
+            <a:off x="2364827" y="765263"/>
+            <a:ext cx="1671137" cy="704193"/>
+          </a:xfrm>
+          <a:prstGeom prst="rect">
+            <a:avLst/>
+          </a:prstGeom>
+        </p:spPr>
+        <p:style>
+          <a:lnRef idx="2">
+            <a:schemeClr val="accent1">
+              <a:shade val="50000"/>
+            </a:schemeClr>
+          </a:lnRef>
+          <a:fillRef idx="1">
+            <a:schemeClr val="accent1"/>
+          </a:fillRef>
+          <a:effectRef idx="0">
+            <a:schemeClr val="accent1"/>
+          </a:effectRef>
+          <a:fontRef idx="minor">
+            <a:schemeClr val="lt1"/>
+          </a:fontRef>
+        </p:style>
+        <p:txBody>
+          <a:bodyPr rtlCol="0" anchor="ctr"/>
+          <a:lstStyle/>
+          <a:p>
+            <a:pPr algn="ctr"/>
+            <a:r>
+              <a:rPr kumimoji="1" lang="en-US" altLang="ko-Kore-KR" dirty="0" err="1"/>
+              <a:t>ClientApp</a:t>
+            </a:r>
+            <a:endParaRPr kumimoji="1" lang="ko-Kore-KR" altLang="en-US" dirty="0"/>
+          </a:p>
+        </p:txBody>
+      </p:sp>
+      <p:sp>
+        <p:nvSpPr>
+          <p:cNvPr id="4" name="직사각형 3">
+            <a:extLst>
+              <a:ext uri="{FF2B5EF4-FFF2-40B4-BE49-F238E27FC236}">
+                <a16:creationId xmlns:a16="http://schemas.microsoft.com/office/drawing/2014/main" id="{EC43D43B-9A91-FDAC-3446-3F1E64ADE441}"/>
+              </a:ext>
+            </a:extLst>
+          </p:cNvPr>
+          <p:cNvSpPr/>
+          <p:nvPr/>
+        </p:nvSpPr>
+        <p:spPr>
+          <a:xfrm>
+            <a:off x="6161330" y="765263"/>
+            <a:ext cx="1671147" cy="704193"/>
+          </a:xfrm>
+          <a:prstGeom prst="rect">
+            <a:avLst/>
+          </a:prstGeom>
+        </p:spPr>
+        <p:style>
+          <a:lnRef idx="2">
+            <a:schemeClr val="accent1">
+              <a:shade val="50000"/>
+            </a:schemeClr>
+          </a:lnRef>
+          <a:fillRef idx="1">
+            <a:schemeClr val="accent1"/>
+          </a:fillRef>
+          <a:effectRef idx="0">
+            <a:schemeClr val="accent1"/>
+          </a:effectRef>
+          <a:fontRef idx="minor">
+            <a:schemeClr val="lt1"/>
+          </a:fontRef>
+        </p:style>
+        <p:txBody>
+          <a:bodyPr rtlCol="0" anchor="ctr"/>
+          <a:lstStyle/>
+          <a:p>
+            <a:pPr algn="ctr"/>
+            <a:r>
+              <a:rPr kumimoji="1" lang="en-US" altLang="ko-Kore-KR" dirty="0" err="1"/>
+              <a:t>ServerApp</a:t>
+            </a:r>
+            <a:endParaRPr kumimoji="1" lang="ko-Kore-KR" altLang="en-US" dirty="0"/>
+          </a:p>
+        </p:txBody>
+      </p:sp>
+      <p:sp>
+        <p:nvSpPr>
+          <p:cNvPr id="5" name="직사각형 4">
+            <a:extLst>
+              <a:ext uri="{FF2B5EF4-FFF2-40B4-BE49-F238E27FC236}">
+                <a16:creationId xmlns:a16="http://schemas.microsoft.com/office/drawing/2014/main" id="{7D19E0DF-F8BA-8722-606A-6C437221B4C9}"/>
+              </a:ext>
+            </a:extLst>
+          </p:cNvPr>
+          <p:cNvSpPr/>
+          <p:nvPr/>
+        </p:nvSpPr>
+        <p:spPr>
+          <a:xfrm>
+            <a:off x="2364827" y="2940671"/>
+            <a:ext cx="1671146" cy="704193"/>
+          </a:xfrm>
+          <a:prstGeom prst="rect">
+            <a:avLst/>
+          </a:prstGeom>
+        </p:spPr>
+        <p:style>
+          <a:lnRef idx="2">
+            <a:schemeClr val="accent1">
+              <a:shade val="50000"/>
+            </a:schemeClr>
+          </a:lnRef>
+          <a:fillRef idx="1">
+            <a:schemeClr val="accent1"/>
+          </a:fillRef>
+          <a:effectRef idx="0">
+            <a:schemeClr val="accent1"/>
+          </a:effectRef>
+          <a:fontRef idx="minor">
+            <a:schemeClr val="lt1"/>
+          </a:fontRef>
+        </p:style>
+        <p:txBody>
+          <a:bodyPr rtlCol="0" anchor="ctr"/>
+          <a:lstStyle/>
+          <a:p>
+            <a:pPr algn="ctr"/>
+            <a:r>
+              <a:rPr kumimoji="1" lang="en-US" altLang="ko-Kore-KR" dirty="0" err="1"/>
+              <a:t>BoardHandler</a:t>
+            </a:r>
+            <a:endParaRPr kumimoji="1" lang="ko-Kore-KR" altLang="en-US" dirty="0"/>
+          </a:p>
+        </p:txBody>
+      </p:sp>
+      <p:sp>
+        <p:nvSpPr>
+          <p:cNvPr id="6" name="직사각형 5">
+            <a:extLst>
+              <a:ext uri="{FF2B5EF4-FFF2-40B4-BE49-F238E27FC236}">
+                <a16:creationId xmlns:a16="http://schemas.microsoft.com/office/drawing/2014/main" id="{87AF28F9-9300-9784-84A6-1A36A5A39417}"/>
+              </a:ext>
+            </a:extLst>
+          </p:cNvPr>
+          <p:cNvSpPr/>
+          <p:nvPr/>
+        </p:nvSpPr>
+        <p:spPr>
+          <a:xfrm>
+            <a:off x="6161330" y="2940669"/>
+            <a:ext cx="1671147" cy="704193"/>
+          </a:xfrm>
+          <a:prstGeom prst="rect">
+            <a:avLst/>
+          </a:prstGeom>
+        </p:spPr>
+        <p:style>
+          <a:lnRef idx="2">
+            <a:schemeClr val="accent1">
+              <a:shade val="50000"/>
+            </a:schemeClr>
+          </a:lnRef>
+          <a:fillRef idx="1">
+            <a:schemeClr val="accent1"/>
+          </a:fillRef>
+          <a:effectRef idx="0">
+            <a:schemeClr val="accent1"/>
+          </a:effectRef>
+          <a:fontRef idx="minor">
+            <a:schemeClr val="lt1"/>
+          </a:fontRef>
+        </p:style>
+        <p:txBody>
+          <a:bodyPr rtlCol="0" anchor="ctr"/>
+          <a:lstStyle/>
+          <a:p>
+            <a:pPr algn="ctr"/>
+            <a:r>
+              <a:rPr kumimoji="1" lang="en-US" altLang="ko-Kore-KR" dirty="0" err="1"/>
+              <a:t>BoardServlet</a:t>
+            </a:r>
+            <a:endParaRPr kumimoji="1" lang="ko-Kore-KR" altLang="en-US" dirty="0"/>
+          </a:p>
+        </p:txBody>
+      </p:sp>
+      <p:sp>
+        <p:nvSpPr>
+          <p:cNvPr id="7" name="직사각형 6">
+            <a:extLst>
+              <a:ext uri="{FF2B5EF4-FFF2-40B4-BE49-F238E27FC236}">
+                <a16:creationId xmlns:a16="http://schemas.microsoft.com/office/drawing/2014/main" id="{FA51ECA7-1914-9A78-B6FC-A0F3131DD8CA}"/>
+              </a:ext>
+            </a:extLst>
+          </p:cNvPr>
+          <p:cNvSpPr/>
+          <p:nvPr/>
+        </p:nvSpPr>
+        <p:spPr>
+          <a:xfrm>
+            <a:off x="8668051" y="2940669"/>
+            <a:ext cx="1671147" cy="704193"/>
+          </a:xfrm>
+          <a:prstGeom prst="rect">
+            <a:avLst/>
+          </a:prstGeom>
+        </p:spPr>
+        <p:style>
+          <a:lnRef idx="2">
+            <a:schemeClr val="accent1">
+              <a:shade val="50000"/>
+            </a:schemeClr>
+          </a:lnRef>
+          <a:fillRef idx="1">
+            <a:schemeClr val="accent1"/>
+          </a:fillRef>
+          <a:effectRef idx="0">
+            <a:schemeClr val="accent1"/>
+          </a:effectRef>
+          <a:fontRef idx="minor">
+            <a:schemeClr val="lt1"/>
+          </a:fontRef>
+        </p:style>
+        <p:txBody>
+          <a:bodyPr rtlCol="0" anchor="ctr"/>
+          <a:lstStyle/>
+          <a:p>
+            <a:pPr algn="ctr"/>
+            <a:r>
+              <a:rPr kumimoji="1" lang="en-US" altLang="ko-Kore-KR" dirty="0" err="1"/>
+              <a:t>BoardDao</a:t>
+            </a:r>
+            <a:endParaRPr kumimoji="1" lang="ko-Kore-KR" altLang="en-US" dirty="0"/>
+          </a:p>
+        </p:txBody>
+      </p:sp>
+      <p:sp>
+        <p:nvSpPr>
+          <p:cNvPr id="8" name="직사각형 7">
+            <a:extLst>
+              <a:ext uri="{FF2B5EF4-FFF2-40B4-BE49-F238E27FC236}">
+                <a16:creationId xmlns:a16="http://schemas.microsoft.com/office/drawing/2014/main" id="{10B95E9D-9DEA-BC47-AEB2-D8D5E140D5BD}"/>
+              </a:ext>
+            </a:extLst>
+          </p:cNvPr>
+          <p:cNvSpPr/>
+          <p:nvPr/>
+        </p:nvSpPr>
+        <p:spPr>
+          <a:xfrm>
+            <a:off x="11174772" y="2940669"/>
+            <a:ext cx="982717" cy="704193"/>
+          </a:xfrm>
+          <a:prstGeom prst="rect">
+            <a:avLst/>
+          </a:prstGeom>
+        </p:spPr>
+        <p:style>
+          <a:lnRef idx="2">
+            <a:schemeClr val="accent1">
+              <a:shade val="50000"/>
+            </a:schemeClr>
+          </a:lnRef>
+          <a:fillRef idx="1">
+            <a:schemeClr val="accent1"/>
+          </a:fillRef>
+          <a:effectRef idx="0">
+            <a:schemeClr val="accent1"/>
+          </a:effectRef>
+          <a:fontRef idx="minor">
+            <a:schemeClr val="lt1"/>
+          </a:fontRef>
+        </p:style>
+        <p:txBody>
+          <a:bodyPr rtlCol="0" anchor="ctr"/>
+          <a:lstStyle/>
+          <a:p>
+            <a:pPr algn="ctr"/>
+            <a:r>
+              <a:rPr kumimoji="1" lang="en-US" altLang="ko-Kore-KR" dirty="0"/>
+              <a:t>List</a:t>
+            </a:r>
+            <a:endParaRPr kumimoji="1" lang="ko-Kore-KR" altLang="en-US" dirty="0"/>
+          </a:p>
+        </p:txBody>
+      </p:sp>
+      <p:sp>
+        <p:nvSpPr>
+          <p:cNvPr id="9" name="한쪽 모서리가 잘린 사각형 8">
+            <a:extLst>
+              <a:ext uri="{FF2B5EF4-FFF2-40B4-BE49-F238E27FC236}">
+                <a16:creationId xmlns:a16="http://schemas.microsoft.com/office/drawing/2014/main" id="{307964E3-2F10-8235-4FB9-CC3502D87EF2}"/>
+              </a:ext>
+            </a:extLst>
+          </p:cNvPr>
+          <p:cNvSpPr/>
+          <p:nvPr/>
+        </p:nvSpPr>
+        <p:spPr>
+          <a:xfrm>
+            <a:off x="9014893" y="4992176"/>
+            <a:ext cx="977462" cy="1082565"/>
+          </a:xfrm>
+          <a:prstGeom prst="snip1Rect">
+            <a:avLst/>
+          </a:prstGeom>
+        </p:spPr>
+        <p:style>
+          <a:lnRef idx="2">
+            <a:schemeClr val="accent1">
+              <a:shade val="50000"/>
+            </a:schemeClr>
+          </a:lnRef>
+          <a:fillRef idx="1">
+            <a:schemeClr val="accent1"/>
+          </a:fillRef>
+          <a:effectRef idx="0">
+            <a:schemeClr val="accent1"/>
+          </a:effectRef>
+          <a:fontRef idx="minor">
+            <a:schemeClr val="lt1"/>
+          </a:fontRef>
+        </p:style>
+        <p:txBody>
+          <a:bodyPr rtlCol="0" anchor="ctr"/>
+          <a:lstStyle/>
+          <a:p>
+            <a:pPr algn="ctr"/>
+            <a:r>
+              <a:rPr kumimoji="1" lang="en-US" altLang="ko-Kore-KR" dirty="0"/>
+              <a:t>File</a:t>
+            </a:r>
+            <a:endParaRPr kumimoji="1" lang="ko-Kore-KR" altLang="en-US" dirty="0"/>
+          </a:p>
+        </p:txBody>
+      </p:sp>
+      <p:cxnSp>
+        <p:nvCxnSpPr>
+          <p:cNvPr id="11" name="직선 화살표 연결선 10">
+            <a:extLst>
+              <a:ext uri="{FF2B5EF4-FFF2-40B4-BE49-F238E27FC236}">
+                <a16:creationId xmlns:a16="http://schemas.microsoft.com/office/drawing/2014/main" id="{FF1EFC55-E413-A08E-B79B-C181AC818EC9}"/>
+              </a:ext>
+            </a:extLst>
+          </p:cNvPr>
+          <p:cNvCxnSpPr>
+            <a:cxnSpLocks/>
+            <a:stCxn id="2" idx="7"/>
+            <a:endCxn id="3" idx="1"/>
+          </p:cNvCxnSpPr>
+          <p:nvPr/>
+        </p:nvCxnSpPr>
+        <p:spPr>
+          <a:xfrm flipV="1">
+            <a:off x="986826" y="1117360"/>
+            <a:ext cx="1378001" cy="707733"/>
+          </a:xfrm>
+          <a:prstGeom prst="straightConnector1">
+            <a:avLst/>
+          </a:prstGeom>
+          <a:ln>
+            <a:headEnd type="triangle"/>
+            <a:tailEnd type="triangle"/>
+          </a:ln>
+        </p:spPr>
+        <p:style>
+          <a:lnRef idx="3">
+            <a:schemeClr val="accent1"/>
+          </a:lnRef>
+          <a:fillRef idx="0">
+            <a:schemeClr val="accent1"/>
+          </a:fillRef>
+          <a:effectRef idx="2">
+            <a:schemeClr val="accent1"/>
+          </a:effectRef>
+          <a:fontRef idx="minor">
+            <a:schemeClr val="tx1"/>
+          </a:fontRef>
+        </p:style>
+      </p:cxnSp>
+      <p:cxnSp>
+        <p:nvCxnSpPr>
+          <p:cNvPr id="12" name="직선 화살표 연결선 11">
+            <a:extLst>
+              <a:ext uri="{FF2B5EF4-FFF2-40B4-BE49-F238E27FC236}">
+                <a16:creationId xmlns:a16="http://schemas.microsoft.com/office/drawing/2014/main" id="{87D8D2A0-7C31-1165-7631-B33BEFACF8D1}"/>
+              </a:ext>
+            </a:extLst>
+          </p:cNvPr>
+          <p:cNvCxnSpPr>
+            <a:cxnSpLocks/>
+            <a:stCxn id="2" idx="5"/>
+            <a:endCxn id="5" idx="1"/>
+          </p:cNvCxnSpPr>
+          <p:nvPr/>
+        </p:nvCxnSpPr>
+        <p:spPr>
+          <a:xfrm>
+            <a:off x="986826" y="2642607"/>
+            <a:ext cx="1378001" cy="650161"/>
+          </a:xfrm>
+          <a:prstGeom prst="straightConnector1">
+            <a:avLst/>
+          </a:prstGeom>
+          <a:ln>
+            <a:headEnd type="triangle"/>
+            <a:tailEnd type="triangle"/>
+          </a:ln>
+        </p:spPr>
+        <p:style>
+          <a:lnRef idx="3">
+            <a:schemeClr val="accent1"/>
+          </a:lnRef>
+          <a:fillRef idx="0">
+            <a:schemeClr val="accent1"/>
+          </a:fillRef>
+          <a:effectRef idx="2">
+            <a:schemeClr val="accent1"/>
+          </a:effectRef>
+          <a:fontRef idx="minor">
+            <a:schemeClr val="tx1"/>
+          </a:fontRef>
+        </p:style>
+      </p:cxnSp>
+      <p:cxnSp>
+        <p:nvCxnSpPr>
+          <p:cNvPr id="15" name="직선 화살표 연결선 14">
+            <a:extLst>
+              <a:ext uri="{FF2B5EF4-FFF2-40B4-BE49-F238E27FC236}">
+                <a16:creationId xmlns:a16="http://schemas.microsoft.com/office/drawing/2014/main" id="{EFEA8B73-EB14-1C8F-D183-1250770730E6}"/>
+              </a:ext>
+            </a:extLst>
+          </p:cNvPr>
+          <p:cNvCxnSpPr>
+            <a:cxnSpLocks/>
+            <a:stCxn id="3" idx="3"/>
+            <a:endCxn id="4" idx="1"/>
+          </p:cNvCxnSpPr>
+          <p:nvPr/>
+        </p:nvCxnSpPr>
+        <p:spPr>
+          <a:xfrm>
+            <a:off x="4035964" y="1117360"/>
+            <a:ext cx="2125366" cy="0"/>
+          </a:xfrm>
+          <a:prstGeom prst="straightConnector1">
+            <a:avLst/>
+          </a:prstGeom>
+          <a:ln>
+            <a:headEnd type="triangle"/>
+            <a:tailEnd type="triangle"/>
+          </a:ln>
+        </p:spPr>
+        <p:style>
+          <a:lnRef idx="3">
+            <a:schemeClr val="accent1"/>
+          </a:lnRef>
+          <a:fillRef idx="0">
+            <a:schemeClr val="accent1"/>
+          </a:fillRef>
+          <a:effectRef idx="2">
+            <a:schemeClr val="accent1"/>
+          </a:effectRef>
+          <a:fontRef idx="minor">
+            <a:schemeClr val="tx1"/>
+          </a:fontRef>
+        </p:style>
+      </p:cxnSp>
+      <p:cxnSp>
+        <p:nvCxnSpPr>
+          <p:cNvPr id="19" name="직선 화살표 연결선 18">
+            <a:extLst>
+              <a:ext uri="{FF2B5EF4-FFF2-40B4-BE49-F238E27FC236}">
+                <a16:creationId xmlns:a16="http://schemas.microsoft.com/office/drawing/2014/main" id="{AA8CB740-BFFC-839C-C2BD-11D031ECA980}"/>
+              </a:ext>
+            </a:extLst>
+          </p:cNvPr>
+          <p:cNvCxnSpPr>
+            <a:cxnSpLocks/>
+            <a:stCxn id="5" idx="3"/>
+            <a:endCxn id="6" idx="1"/>
+          </p:cNvCxnSpPr>
+          <p:nvPr/>
+        </p:nvCxnSpPr>
+        <p:spPr>
+          <a:xfrm flipV="1">
+            <a:off x="4035973" y="3292766"/>
+            <a:ext cx="2125357" cy="2"/>
+          </a:xfrm>
+          <a:prstGeom prst="straightConnector1">
+            <a:avLst/>
+          </a:prstGeom>
+          <a:ln>
+            <a:headEnd type="triangle"/>
+            <a:tailEnd type="triangle"/>
+          </a:ln>
+        </p:spPr>
+        <p:style>
+          <a:lnRef idx="3">
+            <a:schemeClr val="accent1"/>
+          </a:lnRef>
+          <a:fillRef idx="0">
+            <a:schemeClr val="accent1"/>
+          </a:fillRef>
+          <a:effectRef idx="2">
+            <a:schemeClr val="accent1"/>
+          </a:effectRef>
+          <a:fontRef idx="minor">
+            <a:schemeClr val="tx1"/>
+          </a:fontRef>
+        </p:style>
+      </p:cxnSp>
+      <p:cxnSp>
+        <p:nvCxnSpPr>
+          <p:cNvPr id="24" name="직선 화살표 연결선 23">
+            <a:extLst>
+              <a:ext uri="{FF2B5EF4-FFF2-40B4-BE49-F238E27FC236}">
+                <a16:creationId xmlns:a16="http://schemas.microsoft.com/office/drawing/2014/main" id="{6BB1543D-453D-1827-9D98-4260BC074C7F}"/>
+              </a:ext>
+            </a:extLst>
+          </p:cNvPr>
+          <p:cNvCxnSpPr>
+            <a:cxnSpLocks/>
+            <a:stCxn id="4" idx="2"/>
+            <a:endCxn id="6" idx="0"/>
+          </p:cNvCxnSpPr>
+          <p:nvPr/>
+        </p:nvCxnSpPr>
+        <p:spPr>
+          <a:xfrm>
+            <a:off x="6996904" y="1469456"/>
+            <a:ext cx="0" cy="1471213"/>
+          </a:xfrm>
+          <a:prstGeom prst="straightConnector1">
+            <a:avLst/>
+          </a:prstGeom>
+          <a:ln>
+            <a:tailEnd type="triangle"/>
+          </a:ln>
+        </p:spPr>
+        <p:style>
+          <a:lnRef idx="3">
+            <a:schemeClr val="accent6"/>
+          </a:lnRef>
+          <a:fillRef idx="0">
+            <a:schemeClr val="accent6"/>
+          </a:fillRef>
+          <a:effectRef idx="2">
+            <a:schemeClr val="accent6"/>
+          </a:effectRef>
+          <a:fontRef idx="minor">
+            <a:schemeClr val="tx1"/>
+          </a:fontRef>
+        </p:style>
+      </p:cxnSp>
+      <p:cxnSp>
+        <p:nvCxnSpPr>
+          <p:cNvPr id="27" name="직선 화살표 연결선 26">
+            <a:extLst>
+              <a:ext uri="{FF2B5EF4-FFF2-40B4-BE49-F238E27FC236}">
+                <a16:creationId xmlns:a16="http://schemas.microsoft.com/office/drawing/2014/main" id="{2B75FC45-877B-62C4-E10B-0CA0384EFE46}"/>
+              </a:ext>
+            </a:extLst>
+          </p:cNvPr>
+          <p:cNvCxnSpPr>
+            <a:cxnSpLocks/>
+            <a:stCxn id="6" idx="3"/>
+            <a:endCxn id="7" idx="1"/>
+          </p:cNvCxnSpPr>
+          <p:nvPr/>
+        </p:nvCxnSpPr>
+        <p:spPr>
+          <a:xfrm>
+            <a:off x="7832477" y="3292766"/>
+            <a:ext cx="835574" cy="0"/>
+          </a:xfrm>
+          <a:prstGeom prst="straightConnector1">
+            <a:avLst/>
+          </a:prstGeom>
+          <a:ln>
+            <a:tailEnd type="triangle"/>
+          </a:ln>
+        </p:spPr>
+        <p:style>
+          <a:lnRef idx="3">
+            <a:schemeClr val="accent6"/>
+          </a:lnRef>
+          <a:fillRef idx="0">
+            <a:schemeClr val="accent6"/>
+          </a:fillRef>
+          <a:effectRef idx="2">
+            <a:schemeClr val="accent6"/>
+          </a:effectRef>
+          <a:fontRef idx="minor">
+            <a:schemeClr val="tx1"/>
+          </a:fontRef>
+        </p:style>
+      </p:cxnSp>
+      <p:cxnSp>
+        <p:nvCxnSpPr>
+          <p:cNvPr id="37" name="직선 화살표 연결선 36">
+            <a:extLst>
+              <a:ext uri="{FF2B5EF4-FFF2-40B4-BE49-F238E27FC236}">
+                <a16:creationId xmlns:a16="http://schemas.microsoft.com/office/drawing/2014/main" id="{500C63E2-11C2-4AE2-46E8-47EC44D54AB0}"/>
+              </a:ext>
+            </a:extLst>
+          </p:cNvPr>
+          <p:cNvCxnSpPr>
+            <a:cxnSpLocks/>
+            <a:stCxn id="7" idx="2"/>
+            <a:endCxn id="9" idx="3"/>
+          </p:cNvCxnSpPr>
+          <p:nvPr/>
+        </p:nvCxnSpPr>
+        <p:spPr>
+          <a:xfrm flipH="1">
+            <a:off x="9503624" y="3644862"/>
+            <a:ext cx="1" cy="1347314"/>
+          </a:xfrm>
+          <a:prstGeom prst="straightConnector1">
+            <a:avLst/>
+          </a:prstGeom>
+          <a:ln>
+            <a:tailEnd type="triangle"/>
+          </a:ln>
+        </p:spPr>
+        <p:style>
+          <a:lnRef idx="3">
+            <a:schemeClr val="accent6"/>
+          </a:lnRef>
+          <a:fillRef idx="0">
+            <a:schemeClr val="accent6"/>
+          </a:fillRef>
+          <a:effectRef idx="2">
+            <a:schemeClr val="accent6"/>
+          </a:effectRef>
+          <a:fontRef idx="minor">
+            <a:schemeClr val="tx1"/>
+          </a:fontRef>
+        </p:style>
+      </p:cxnSp>
+      <p:cxnSp>
+        <p:nvCxnSpPr>
+          <p:cNvPr id="41" name="구부러진 연결선[U] 40">
+            <a:extLst>
+              <a:ext uri="{FF2B5EF4-FFF2-40B4-BE49-F238E27FC236}">
+                <a16:creationId xmlns:a16="http://schemas.microsoft.com/office/drawing/2014/main" id="{51FB046B-9BE3-EDEC-4DF8-018DCB2EF0DC}"/>
+              </a:ext>
+            </a:extLst>
+          </p:cNvPr>
+          <p:cNvCxnSpPr>
+            <a:cxnSpLocks/>
+            <a:stCxn id="9" idx="2"/>
+            <a:endCxn id="7" idx="1"/>
+          </p:cNvCxnSpPr>
+          <p:nvPr/>
+        </p:nvCxnSpPr>
+        <p:spPr>
+          <a:xfrm rot="10800000">
+            <a:off x="8668051" y="3292767"/>
+            <a:ext cx="346842" cy="2240693"/>
+          </a:xfrm>
+          <a:prstGeom prst="curvedConnector3">
+            <a:avLst>
+              <a:gd name="adj1" fmla="val 165909"/>
+            </a:avLst>
+          </a:prstGeom>
+          <a:ln>
+            <a:tailEnd type="triangle"/>
+          </a:ln>
+        </p:spPr>
+        <p:style>
+          <a:lnRef idx="3">
+            <a:schemeClr val="accent4"/>
+          </a:lnRef>
+          <a:fillRef idx="0">
+            <a:schemeClr val="accent4"/>
+          </a:fillRef>
+          <a:effectRef idx="2">
+            <a:schemeClr val="accent4"/>
+          </a:effectRef>
+          <a:fontRef idx="minor">
+            <a:schemeClr val="tx1"/>
+          </a:fontRef>
+        </p:style>
+      </p:cxnSp>
+      <p:cxnSp>
+        <p:nvCxnSpPr>
+          <p:cNvPr id="43" name="구부러진 연결선[U] 42">
+            <a:extLst>
+              <a:ext uri="{FF2B5EF4-FFF2-40B4-BE49-F238E27FC236}">
+                <a16:creationId xmlns:a16="http://schemas.microsoft.com/office/drawing/2014/main" id="{85EB805E-D4A4-3E48-F929-234025293AB4}"/>
+              </a:ext>
+            </a:extLst>
+          </p:cNvPr>
+          <p:cNvCxnSpPr>
+            <a:cxnSpLocks/>
+            <a:stCxn id="6" idx="2"/>
+            <a:endCxn id="5" idx="2"/>
+          </p:cNvCxnSpPr>
+          <p:nvPr/>
+        </p:nvCxnSpPr>
+        <p:spPr>
+          <a:xfrm rot="5400000">
+            <a:off x="5098651" y="1746611"/>
+            <a:ext cx="2" cy="3796504"/>
+          </a:xfrm>
+          <a:prstGeom prst="curvedConnector3">
+            <a:avLst>
+              <a:gd name="adj1" fmla="val 11430100000"/>
+            </a:avLst>
+          </a:prstGeom>
+          <a:ln>
+            <a:tailEnd type="triangle"/>
+          </a:ln>
+        </p:spPr>
+        <p:style>
+          <a:lnRef idx="3">
+            <a:schemeClr val="accent4"/>
+          </a:lnRef>
+          <a:fillRef idx="0">
+            <a:schemeClr val="accent4"/>
+          </a:fillRef>
+          <a:effectRef idx="2">
+            <a:schemeClr val="accent4"/>
+          </a:effectRef>
+          <a:fontRef idx="minor">
+            <a:schemeClr val="tx1"/>
+          </a:fontRef>
+        </p:style>
+      </p:cxnSp>
+      <p:sp>
+        <p:nvSpPr>
+          <p:cNvPr id="48" name="TextBox 47">
+            <a:extLst>
+              <a:ext uri="{FF2B5EF4-FFF2-40B4-BE49-F238E27FC236}">
+                <a16:creationId xmlns:a16="http://schemas.microsoft.com/office/drawing/2014/main" id="{806DA19E-4C51-A35B-6319-4CE122540A73}"/>
+              </a:ext>
+            </a:extLst>
+          </p:cNvPr>
+          <p:cNvSpPr txBox="1"/>
+          <p:nvPr/>
+        </p:nvSpPr>
+        <p:spPr>
+          <a:xfrm>
+            <a:off x="794860" y="902775"/>
+            <a:ext cx="1202777" cy="307777"/>
+          </a:xfrm>
+          <a:prstGeom prst="rect">
+            <a:avLst/>
+          </a:prstGeom>
+        </p:spPr>
+        <p:style>
+          <a:lnRef idx="2">
+            <a:schemeClr val="accent6"/>
+          </a:lnRef>
+          <a:fillRef idx="1">
+            <a:schemeClr val="lt1"/>
+          </a:fillRef>
+          <a:effectRef idx="0">
+            <a:schemeClr val="accent6"/>
+          </a:effectRef>
+          <a:fontRef idx="minor">
+            <a:schemeClr val="dk1"/>
+          </a:fontRef>
+        </p:style>
+        <p:txBody>
+          <a:bodyPr wrap="square" rtlCol="0">
+            <a:spAutoFit/>
+          </a:bodyPr>
+          <a:lstStyle/>
+          <a:p>
+            <a:pPr algn="ctr"/>
+            <a:r>
+              <a:rPr kumimoji="1" lang="ko-Kore-KR" altLang="en-US" sz="1400" dirty="0"/>
+              <a:t>메인메뉴</a:t>
+            </a:r>
+          </a:p>
+        </p:txBody>
+      </p:sp>
+      <p:sp>
+        <p:nvSpPr>
+          <p:cNvPr id="49" name="TextBox 48">
+            <a:extLst>
+              <a:ext uri="{FF2B5EF4-FFF2-40B4-BE49-F238E27FC236}">
+                <a16:creationId xmlns:a16="http://schemas.microsoft.com/office/drawing/2014/main" id="{41A2354D-3189-98B6-DD0D-F9851C0689D9}"/>
+              </a:ext>
+            </a:extLst>
+          </p:cNvPr>
+          <p:cNvSpPr txBox="1"/>
+          <p:nvPr/>
+        </p:nvSpPr>
+        <p:spPr>
+          <a:xfrm>
+            <a:off x="1272499" y="2324319"/>
+            <a:ext cx="1436968" cy="523220"/>
+          </a:xfrm>
+          <a:prstGeom prst="rect">
+            <a:avLst/>
+          </a:prstGeom>
+        </p:spPr>
+        <p:style>
+          <a:lnRef idx="2">
+            <a:schemeClr val="accent6"/>
+          </a:lnRef>
+          <a:fillRef idx="1">
+            <a:schemeClr val="lt1"/>
+          </a:fillRef>
+          <a:effectRef idx="0">
+            <a:schemeClr val="accent6"/>
+          </a:effectRef>
+          <a:fontRef idx="minor">
+            <a:schemeClr val="dk1"/>
+          </a:fontRef>
+        </p:style>
+        <p:txBody>
+          <a:bodyPr wrap="square" rtlCol="0">
+            <a:spAutoFit/>
+          </a:bodyPr>
+          <a:lstStyle/>
+          <a:p>
+            <a:pPr algn="ctr"/>
+            <a:r>
+              <a:rPr kumimoji="1" lang="ko-Kore-KR" altLang="en-US" sz="1400" dirty="0"/>
+              <a:t>게시판메뉴번호</a:t>
+            </a:r>
+            <a:endParaRPr kumimoji="1" lang="en-US" altLang="ko-Kore-KR" sz="1400" dirty="0"/>
+          </a:p>
+          <a:p>
+            <a:pPr algn="ctr"/>
+            <a:r>
+              <a:rPr kumimoji="1" lang="ko-Kore-KR" altLang="en-US" sz="1400" dirty="0"/>
+              <a:t>제공</a:t>
+            </a:r>
+          </a:p>
+        </p:txBody>
+      </p:sp>
+      <p:sp>
+        <p:nvSpPr>
+          <p:cNvPr id="50" name="TextBox 49">
+            <a:extLst>
+              <a:ext uri="{FF2B5EF4-FFF2-40B4-BE49-F238E27FC236}">
+                <a16:creationId xmlns:a16="http://schemas.microsoft.com/office/drawing/2014/main" id="{0C20D505-7468-8FCE-42D3-AFAF20EAEDB7}"/>
+              </a:ext>
+            </a:extLst>
+          </p:cNvPr>
+          <p:cNvSpPr txBox="1"/>
+          <p:nvPr/>
+        </p:nvSpPr>
+        <p:spPr>
+          <a:xfrm>
+            <a:off x="865867" y="3049535"/>
+            <a:ext cx="1202777" cy="523220"/>
+          </a:xfrm>
+          <a:prstGeom prst="rect">
+            <a:avLst/>
+          </a:prstGeom>
+        </p:spPr>
+        <p:style>
+          <a:lnRef idx="2">
+            <a:schemeClr val="accent4"/>
+          </a:lnRef>
+          <a:fillRef idx="1">
+            <a:schemeClr val="lt1"/>
+          </a:fillRef>
+          <a:effectRef idx="0">
+            <a:schemeClr val="accent4"/>
+          </a:effectRef>
+          <a:fontRef idx="minor">
+            <a:schemeClr val="dk1"/>
+          </a:fontRef>
+        </p:style>
+        <p:txBody>
+          <a:bodyPr wrap="square" rtlCol="0">
+            <a:spAutoFit/>
+          </a:bodyPr>
+          <a:lstStyle/>
+          <a:p>
+            <a:pPr algn="ctr"/>
+            <a:r>
+              <a:rPr kumimoji="1" lang="ko-KR" altLang="en-US" sz="1400" dirty="0"/>
+              <a:t>결과화면</a:t>
+            </a:r>
+            <a:endParaRPr kumimoji="1" lang="en-US" altLang="ko-KR" sz="1400" dirty="0"/>
+          </a:p>
+          <a:p>
+            <a:pPr algn="ctr"/>
+            <a:r>
+              <a:rPr kumimoji="1" lang="ko-KR" altLang="en-US" sz="1400" dirty="0"/>
+              <a:t>출력</a:t>
+            </a:r>
+            <a:endParaRPr kumimoji="1" lang="ko-Kore-KR" altLang="en-US" sz="1400" dirty="0"/>
+          </a:p>
+        </p:txBody>
+      </p:sp>
+      <p:cxnSp>
+        <p:nvCxnSpPr>
+          <p:cNvPr id="51" name="직선 화살표 연결선 50">
+            <a:extLst>
+              <a:ext uri="{FF2B5EF4-FFF2-40B4-BE49-F238E27FC236}">
+                <a16:creationId xmlns:a16="http://schemas.microsoft.com/office/drawing/2014/main" id="{CD59C3BE-B328-C3D5-7892-559CB5B86D00}"/>
+              </a:ext>
+            </a:extLst>
+          </p:cNvPr>
+          <p:cNvCxnSpPr>
+            <a:cxnSpLocks/>
+            <a:stCxn id="3" idx="2"/>
+            <a:endCxn id="5" idx="0"/>
+          </p:cNvCxnSpPr>
+          <p:nvPr/>
+        </p:nvCxnSpPr>
+        <p:spPr>
+          <a:xfrm>
+            <a:off x="3200396" y="1469456"/>
+            <a:ext cx="4" cy="1471215"/>
+          </a:xfrm>
+          <a:prstGeom prst="straightConnector1">
+            <a:avLst/>
+          </a:prstGeom>
+          <a:ln>
+            <a:tailEnd type="triangle"/>
+          </a:ln>
+        </p:spPr>
+        <p:style>
+          <a:lnRef idx="3">
+            <a:schemeClr val="accent6"/>
+          </a:lnRef>
+          <a:fillRef idx="0">
+            <a:schemeClr val="accent6"/>
+          </a:fillRef>
+          <a:effectRef idx="2">
+            <a:schemeClr val="accent6"/>
+          </a:effectRef>
+          <a:fontRef idx="minor">
+            <a:schemeClr val="tx1"/>
+          </a:fontRef>
+        </p:style>
+      </p:cxnSp>
+      <p:sp>
+        <p:nvSpPr>
+          <p:cNvPr id="63" name="TextBox 62">
+            <a:extLst>
+              <a:ext uri="{FF2B5EF4-FFF2-40B4-BE49-F238E27FC236}">
+                <a16:creationId xmlns:a16="http://schemas.microsoft.com/office/drawing/2014/main" id="{B836CA5F-D6C9-2F5E-2531-8B1FE12CCC2F}"/>
+              </a:ext>
+            </a:extLst>
+          </p:cNvPr>
+          <p:cNvSpPr txBox="1"/>
+          <p:nvPr/>
+        </p:nvSpPr>
+        <p:spPr>
+          <a:xfrm>
+            <a:off x="3068868" y="1945529"/>
+            <a:ext cx="869393" cy="307777"/>
+          </a:xfrm>
+          <a:prstGeom prst="rect">
+            <a:avLst/>
+          </a:prstGeom>
+        </p:spPr>
+        <p:style>
+          <a:lnRef idx="2">
+            <a:schemeClr val="accent6"/>
+          </a:lnRef>
+          <a:fillRef idx="1">
+            <a:schemeClr val="lt1"/>
+          </a:fillRef>
+          <a:effectRef idx="0">
+            <a:schemeClr val="accent6"/>
+          </a:effectRef>
+          <a:fontRef idx="minor">
+            <a:schemeClr val="dk1"/>
+          </a:fontRef>
+        </p:style>
+        <p:txBody>
+          <a:bodyPr wrap="square" rtlCol="0">
+            <a:spAutoFit/>
+          </a:bodyPr>
+          <a:lstStyle/>
+          <a:p>
+            <a:pPr algn="ctr"/>
+            <a:r>
+              <a:rPr kumimoji="1" lang="en-US" altLang="ko-Kore-KR" sz="1400" dirty="0"/>
+              <a:t>board</a:t>
+            </a:r>
+            <a:endParaRPr kumimoji="1" lang="ko-Kore-KR" altLang="en-US" sz="1400" dirty="0"/>
+          </a:p>
+        </p:txBody>
+      </p:sp>
+      <p:sp>
+        <p:nvSpPr>
+          <p:cNvPr id="64" name="TextBox 63">
+            <a:extLst>
+              <a:ext uri="{FF2B5EF4-FFF2-40B4-BE49-F238E27FC236}">
+                <a16:creationId xmlns:a16="http://schemas.microsoft.com/office/drawing/2014/main" id="{B7BDF570-2429-7A7F-C2AE-47526FBA6539}"/>
+              </a:ext>
+            </a:extLst>
+          </p:cNvPr>
+          <p:cNvSpPr txBox="1"/>
+          <p:nvPr/>
+        </p:nvSpPr>
+        <p:spPr>
+          <a:xfrm>
+            <a:off x="6792445" y="1945530"/>
+            <a:ext cx="869393" cy="307777"/>
+          </a:xfrm>
+          <a:prstGeom prst="rect">
+            <a:avLst/>
+          </a:prstGeom>
+        </p:spPr>
+        <p:style>
+          <a:lnRef idx="2">
+            <a:schemeClr val="accent6"/>
+          </a:lnRef>
+          <a:fillRef idx="1">
+            <a:schemeClr val="lt1"/>
+          </a:fillRef>
+          <a:effectRef idx="0">
+            <a:schemeClr val="accent6"/>
+          </a:effectRef>
+          <a:fontRef idx="minor">
+            <a:schemeClr val="dk1"/>
+          </a:fontRef>
+        </p:style>
+        <p:txBody>
+          <a:bodyPr wrap="square" rtlCol="0">
+            <a:spAutoFit/>
+          </a:bodyPr>
+          <a:lstStyle/>
+          <a:p>
+            <a:pPr algn="ctr"/>
+            <a:r>
+              <a:rPr kumimoji="1" lang="en-US" altLang="ko-Kore-KR" sz="1400" dirty="0"/>
+              <a:t>board</a:t>
+            </a:r>
+            <a:endParaRPr kumimoji="1" lang="ko-Kore-KR" altLang="en-US" sz="1400" dirty="0"/>
+          </a:p>
+        </p:txBody>
+      </p:sp>
+      <p:sp>
+        <p:nvSpPr>
+          <p:cNvPr id="65" name="TextBox 64">
+            <a:extLst>
+              <a:ext uri="{FF2B5EF4-FFF2-40B4-BE49-F238E27FC236}">
+                <a16:creationId xmlns:a16="http://schemas.microsoft.com/office/drawing/2014/main" id="{C5F753A4-6D4E-F29F-1B99-F78FE77B616B}"/>
+              </a:ext>
+            </a:extLst>
+          </p:cNvPr>
+          <p:cNvSpPr txBox="1"/>
+          <p:nvPr/>
+        </p:nvSpPr>
+        <p:spPr>
+          <a:xfrm>
+            <a:off x="3780084" y="2563580"/>
+            <a:ext cx="869393" cy="307777"/>
+          </a:xfrm>
+          <a:prstGeom prst="rect">
+            <a:avLst/>
+          </a:prstGeom>
+        </p:spPr>
+        <p:style>
+          <a:lnRef idx="2">
+            <a:schemeClr val="accent6"/>
+          </a:lnRef>
+          <a:fillRef idx="1">
+            <a:schemeClr val="lt1"/>
+          </a:fillRef>
+          <a:effectRef idx="0">
+            <a:schemeClr val="accent6"/>
+          </a:effectRef>
+          <a:fontRef idx="minor">
+            <a:schemeClr val="dk1"/>
+          </a:fontRef>
+        </p:style>
+        <p:txBody>
+          <a:bodyPr wrap="square" rtlCol="0">
+            <a:spAutoFit/>
+          </a:bodyPr>
+          <a:lstStyle/>
+          <a:p>
+            <a:pPr algn="ctr"/>
+            <a:r>
+              <a:rPr kumimoji="1" lang="en-US" altLang="ko-Kore-KR" sz="1400" dirty="0"/>
+              <a:t>board</a:t>
+            </a:r>
+            <a:endParaRPr kumimoji="1" lang="ko-Kore-KR" altLang="en-US" sz="1400" dirty="0"/>
+          </a:p>
+        </p:txBody>
+      </p:sp>
+      <p:sp>
+        <p:nvSpPr>
+          <p:cNvPr id="66" name="TextBox 65">
+            <a:extLst>
+              <a:ext uri="{FF2B5EF4-FFF2-40B4-BE49-F238E27FC236}">
+                <a16:creationId xmlns:a16="http://schemas.microsoft.com/office/drawing/2014/main" id="{683EA676-23A4-A48C-12AB-3DB3909D54D5}"/>
+              </a:ext>
+            </a:extLst>
+          </p:cNvPr>
+          <p:cNvSpPr txBox="1"/>
+          <p:nvPr/>
+        </p:nvSpPr>
+        <p:spPr>
+          <a:xfrm>
+            <a:off x="3780084" y="2839432"/>
+            <a:ext cx="3012361" cy="307777"/>
+          </a:xfrm>
+          <a:prstGeom prst="rect">
+            <a:avLst/>
+          </a:prstGeom>
+        </p:spPr>
+        <p:style>
+          <a:lnRef idx="2">
+            <a:schemeClr val="accent6"/>
+          </a:lnRef>
+          <a:fillRef idx="1">
+            <a:schemeClr val="lt1"/>
+          </a:fillRef>
+          <a:effectRef idx="0">
+            <a:schemeClr val="accent6"/>
+          </a:effectRef>
+          <a:fontRef idx="minor">
+            <a:schemeClr val="dk1"/>
+          </a:fontRef>
+        </p:style>
+        <p:txBody>
+          <a:bodyPr wrap="square" rtlCol="0">
+            <a:spAutoFit/>
+          </a:bodyPr>
+          <a:lstStyle/>
+          <a:p>
+            <a:pPr algn="ctr"/>
+            <a:r>
+              <a:rPr kumimoji="1" lang="en-US" altLang="ko-Kore-KR" sz="1400" dirty="0"/>
+              <a:t>insert/update/delete/</a:t>
+            </a:r>
+            <a:r>
+              <a:rPr kumimoji="1" lang="en-US" altLang="ko-Kore-KR" sz="1400" dirty="0" err="1"/>
+              <a:t>findAll</a:t>
+            </a:r>
+            <a:r>
+              <a:rPr kumimoji="1" lang="en-US" altLang="ko-Kore-KR" sz="1400" dirty="0"/>
+              <a:t>/…</a:t>
+            </a:r>
+            <a:endParaRPr kumimoji="1" lang="ko-Kore-KR" altLang="en-US" sz="1400" dirty="0"/>
+          </a:p>
+        </p:txBody>
+      </p:sp>
+      <p:sp>
+        <p:nvSpPr>
+          <p:cNvPr id="67" name="TextBox 66">
+            <a:extLst>
+              <a:ext uri="{FF2B5EF4-FFF2-40B4-BE49-F238E27FC236}">
+                <a16:creationId xmlns:a16="http://schemas.microsoft.com/office/drawing/2014/main" id="{1586B101-76AD-AB04-C5C6-6C3AB67A049F}"/>
+              </a:ext>
+            </a:extLst>
+          </p:cNvPr>
+          <p:cNvSpPr txBox="1"/>
+          <p:nvPr/>
+        </p:nvSpPr>
+        <p:spPr>
+          <a:xfrm>
+            <a:off x="4194636" y="3790421"/>
+            <a:ext cx="1808021" cy="307777"/>
+          </a:xfrm>
+          <a:prstGeom prst="rect">
+            <a:avLst/>
+          </a:prstGeom>
+        </p:spPr>
+        <p:style>
+          <a:lnRef idx="2">
+            <a:schemeClr val="accent4"/>
+          </a:lnRef>
+          <a:fillRef idx="1">
+            <a:schemeClr val="lt1"/>
+          </a:fillRef>
+          <a:effectRef idx="0">
+            <a:schemeClr val="accent4"/>
+          </a:effectRef>
+          <a:fontRef idx="minor">
+            <a:schemeClr val="dk1"/>
+          </a:fontRef>
+        </p:style>
+        <p:txBody>
+          <a:bodyPr wrap="square" rtlCol="0">
+            <a:spAutoFit/>
+          </a:bodyPr>
+          <a:lstStyle/>
+          <a:p>
+            <a:pPr algn="ctr"/>
+            <a:r>
+              <a:rPr kumimoji="1" lang="en-US" altLang="ko-Kore-KR" sz="1400" dirty="0"/>
+              <a:t>success/fail</a:t>
+            </a:r>
+            <a:endParaRPr kumimoji="1" lang="ko-Kore-KR" altLang="en-US" sz="1400" dirty="0"/>
+          </a:p>
+        </p:txBody>
+      </p:sp>
+      <p:sp>
+        <p:nvSpPr>
+          <p:cNvPr id="68" name="TextBox 67">
+            <a:extLst>
+              <a:ext uri="{FF2B5EF4-FFF2-40B4-BE49-F238E27FC236}">
+                <a16:creationId xmlns:a16="http://schemas.microsoft.com/office/drawing/2014/main" id="{8BC71CAA-E9E5-33FA-FC77-DB0A246672E4}"/>
+              </a:ext>
+            </a:extLst>
+          </p:cNvPr>
+          <p:cNvSpPr txBox="1"/>
+          <p:nvPr/>
+        </p:nvSpPr>
+        <p:spPr>
+          <a:xfrm>
+            <a:off x="8099552" y="4287984"/>
+            <a:ext cx="602852" cy="307777"/>
+          </a:xfrm>
+          <a:prstGeom prst="rect">
+            <a:avLst/>
+          </a:prstGeom>
+        </p:spPr>
+        <p:style>
+          <a:lnRef idx="2">
+            <a:schemeClr val="accent4"/>
+          </a:lnRef>
+          <a:fillRef idx="1">
+            <a:schemeClr val="lt1"/>
+          </a:fillRef>
+          <a:effectRef idx="0">
+            <a:schemeClr val="accent4"/>
+          </a:effectRef>
+          <a:fontRef idx="minor">
+            <a:schemeClr val="dk1"/>
+          </a:fontRef>
+        </p:style>
+        <p:txBody>
+          <a:bodyPr wrap="square" rtlCol="0">
+            <a:spAutoFit/>
+          </a:bodyPr>
+          <a:lstStyle/>
+          <a:p>
+            <a:pPr algn="ctr"/>
+            <a:r>
+              <a:rPr kumimoji="1" lang="ko-KR" altLang="en-US" sz="1400" dirty="0"/>
+              <a:t>로딩</a:t>
+            </a:r>
+            <a:endParaRPr kumimoji="1" lang="ko-Kore-KR" altLang="en-US" sz="1400" dirty="0"/>
+          </a:p>
+        </p:txBody>
+      </p:sp>
+      <p:sp>
+        <p:nvSpPr>
+          <p:cNvPr id="69" name="TextBox 68">
+            <a:extLst>
+              <a:ext uri="{FF2B5EF4-FFF2-40B4-BE49-F238E27FC236}">
+                <a16:creationId xmlns:a16="http://schemas.microsoft.com/office/drawing/2014/main" id="{5CFE694E-3EC0-E834-4CD7-906E4B11004D}"/>
+              </a:ext>
+            </a:extLst>
+          </p:cNvPr>
+          <p:cNvSpPr txBox="1"/>
+          <p:nvPr/>
+        </p:nvSpPr>
+        <p:spPr>
+          <a:xfrm>
+            <a:off x="9236551" y="4134095"/>
+            <a:ext cx="602852" cy="307777"/>
+          </a:xfrm>
+          <a:prstGeom prst="rect">
+            <a:avLst/>
+          </a:prstGeom>
+        </p:spPr>
+        <p:style>
+          <a:lnRef idx="2">
+            <a:schemeClr val="accent6"/>
+          </a:lnRef>
+          <a:fillRef idx="1">
+            <a:schemeClr val="lt1"/>
+          </a:fillRef>
+          <a:effectRef idx="0">
+            <a:schemeClr val="accent6"/>
+          </a:effectRef>
+          <a:fontRef idx="minor">
+            <a:schemeClr val="dk1"/>
+          </a:fontRef>
+        </p:style>
+        <p:txBody>
+          <a:bodyPr wrap="square" rtlCol="0">
+            <a:spAutoFit/>
+          </a:bodyPr>
+          <a:lstStyle/>
+          <a:p>
+            <a:pPr algn="ctr"/>
+            <a:r>
+              <a:rPr kumimoji="1" lang="ko-KR" altLang="en-US" sz="1400" dirty="0"/>
+              <a:t>저장</a:t>
+            </a:r>
+            <a:endParaRPr kumimoji="1" lang="ko-Kore-KR" altLang="en-US" sz="1400" dirty="0"/>
+          </a:p>
+        </p:txBody>
+      </p:sp>
+      <p:sp>
+        <p:nvSpPr>
+          <p:cNvPr id="70" name="TextBox 69">
+            <a:extLst>
+              <a:ext uri="{FF2B5EF4-FFF2-40B4-BE49-F238E27FC236}">
+                <a16:creationId xmlns:a16="http://schemas.microsoft.com/office/drawing/2014/main" id="{7FECA524-7633-1983-3343-F82DC3AB82F7}"/>
+              </a:ext>
+            </a:extLst>
+          </p:cNvPr>
+          <p:cNvSpPr txBox="1"/>
+          <p:nvPr/>
+        </p:nvSpPr>
+        <p:spPr>
+          <a:xfrm>
+            <a:off x="10455559" y="2846078"/>
+            <a:ext cx="602852" cy="307777"/>
+          </a:xfrm>
+          <a:prstGeom prst="rect">
+            <a:avLst/>
+          </a:prstGeom>
+        </p:spPr>
+        <p:style>
+          <a:lnRef idx="2">
+            <a:schemeClr val="accent6"/>
+          </a:lnRef>
+          <a:fillRef idx="1">
+            <a:schemeClr val="lt1"/>
+          </a:fillRef>
+          <a:effectRef idx="0">
+            <a:schemeClr val="accent6"/>
+          </a:effectRef>
+          <a:fontRef idx="minor">
+            <a:schemeClr val="dk1"/>
+          </a:fontRef>
+        </p:style>
+        <p:txBody>
+          <a:bodyPr wrap="square" rtlCol="0">
+            <a:spAutoFit/>
+          </a:bodyPr>
+          <a:lstStyle/>
+          <a:p>
+            <a:pPr algn="ctr"/>
+            <a:r>
+              <a:rPr kumimoji="1" lang="en-US" altLang="ko-KR" sz="1400" dirty="0"/>
+              <a:t>add()</a:t>
+            </a:r>
+            <a:endParaRPr kumimoji="1" lang="ko-Kore-KR" altLang="en-US" sz="1400" dirty="0"/>
+          </a:p>
+        </p:txBody>
+      </p:sp>
+      <p:sp>
+        <p:nvSpPr>
+          <p:cNvPr id="71" name="TextBox 70">
+            <a:extLst>
+              <a:ext uri="{FF2B5EF4-FFF2-40B4-BE49-F238E27FC236}">
+                <a16:creationId xmlns:a16="http://schemas.microsoft.com/office/drawing/2014/main" id="{86DA9BFB-D3F7-61C7-3B8C-CD25C82F145A}"/>
+              </a:ext>
+            </a:extLst>
+          </p:cNvPr>
+          <p:cNvSpPr txBox="1"/>
+          <p:nvPr/>
+        </p:nvSpPr>
+        <p:spPr>
+          <a:xfrm>
+            <a:off x="10455559" y="3378640"/>
+            <a:ext cx="602852" cy="307777"/>
+          </a:xfrm>
+          <a:prstGeom prst="rect">
+            <a:avLst/>
+          </a:prstGeom>
+        </p:spPr>
+        <p:style>
+          <a:lnRef idx="2">
+            <a:schemeClr val="accent4"/>
+          </a:lnRef>
+          <a:fillRef idx="1">
+            <a:schemeClr val="lt1"/>
+          </a:fillRef>
+          <a:effectRef idx="0">
+            <a:schemeClr val="accent4"/>
+          </a:effectRef>
+          <a:fontRef idx="minor">
+            <a:schemeClr val="dk1"/>
+          </a:fontRef>
+        </p:style>
+        <p:txBody>
+          <a:bodyPr wrap="square" rtlCol="0">
+            <a:spAutoFit/>
+          </a:bodyPr>
+          <a:lstStyle/>
+          <a:p>
+            <a:pPr algn="ctr"/>
+            <a:r>
+              <a:rPr kumimoji="1" lang="en-US" altLang="ko-KR" sz="1400" dirty="0"/>
+              <a:t>get()</a:t>
+            </a:r>
+            <a:endParaRPr kumimoji="1" lang="ko-Kore-KR" altLang="en-US" sz="1400" dirty="0"/>
+          </a:p>
+        </p:txBody>
+      </p:sp>
+      <p:cxnSp>
+        <p:nvCxnSpPr>
+          <p:cNvPr id="72" name="직선 화살표 연결선 71">
+            <a:extLst>
+              <a:ext uri="{FF2B5EF4-FFF2-40B4-BE49-F238E27FC236}">
+                <a16:creationId xmlns:a16="http://schemas.microsoft.com/office/drawing/2014/main" id="{76256586-031B-BDE5-1FE9-28C29753CD29}"/>
+              </a:ext>
+            </a:extLst>
+          </p:cNvPr>
+          <p:cNvCxnSpPr>
+            <a:cxnSpLocks/>
+            <a:stCxn id="7" idx="3"/>
+            <a:endCxn id="8" idx="1"/>
+          </p:cNvCxnSpPr>
+          <p:nvPr/>
+        </p:nvCxnSpPr>
+        <p:spPr>
+          <a:xfrm>
+            <a:off x="10339198" y="3292766"/>
+            <a:ext cx="835574" cy="0"/>
+          </a:xfrm>
+          <a:prstGeom prst="straightConnector1">
+            <a:avLst/>
+          </a:prstGeom>
+          <a:ln>
+            <a:headEnd type="triangle"/>
+            <a:tailEnd type="triangle"/>
+          </a:ln>
+        </p:spPr>
+        <p:style>
+          <a:lnRef idx="3">
+            <a:schemeClr val="accent1"/>
+          </a:lnRef>
+          <a:fillRef idx="0">
+            <a:schemeClr val="accent1"/>
+          </a:fillRef>
+          <a:effectRef idx="2">
+            <a:schemeClr val="accent1"/>
+          </a:effectRef>
+          <a:fontRef idx="minor">
+            <a:schemeClr val="tx1"/>
+          </a:fontRef>
+        </p:style>
+      </p:cxnSp>
+      <p:sp>
+        <p:nvSpPr>
+          <p:cNvPr id="75" name="TextBox 74">
+            <a:extLst>
+              <a:ext uri="{FF2B5EF4-FFF2-40B4-BE49-F238E27FC236}">
+                <a16:creationId xmlns:a16="http://schemas.microsoft.com/office/drawing/2014/main" id="{B9A2B647-1DBF-17F8-F127-23CECB10DD29}"/>
+              </a:ext>
+            </a:extLst>
+          </p:cNvPr>
+          <p:cNvSpPr txBox="1"/>
+          <p:nvPr/>
+        </p:nvSpPr>
+        <p:spPr>
+          <a:xfrm>
+            <a:off x="2615591" y="4009799"/>
+            <a:ext cx="1169607" cy="307777"/>
+          </a:xfrm>
+          <a:prstGeom prst="rect">
+            <a:avLst/>
+          </a:prstGeom>
+          <a:ln>
+            <a:solidFill>
+              <a:srgbClr val="FF00A8"/>
+            </a:solidFill>
+          </a:ln>
+        </p:spPr>
+        <p:style>
+          <a:lnRef idx="2">
+            <a:schemeClr val="accent2"/>
+          </a:lnRef>
+          <a:fillRef idx="1">
+            <a:schemeClr val="lt1"/>
+          </a:fillRef>
+          <a:effectRef idx="0">
+            <a:schemeClr val="accent2"/>
+          </a:effectRef>
+          <a:fontRef idx="minor">
+            <a:schemeClr val="dk1"/>
+          </a:fontRef>
+        </p:style>
+        <p:txBody>
+          <a:bodyPr wrap="square" rtlCol="0">
+            <a:spAutoFit/>
+          </a:bodyPr>
+          <a:lstStyle/>
+          <a:p>
+            <a:pPr algn="ctr"/>
+            <a:r>
+              <a:rPr kumimoji="1" lang="en-US" altLang="ko-Kore-KR" sz="1400" dirty="0"/>
+              <a:t>UI </a:t>
+            </a:r>
+            <a:r>
+              <a:rPr kumimoji="1" lang="ko-Kore-KR" altLang="en-US" sz="1400" dirty="0"/>
+              <a:t>처리</a:t>
+            </a:r>
+          </a:p>
+        </p:txBody>
+      </p:sp>
+      <p:sp>
+        <p:nvSpPr>
+          <p:cNvPr id="76" name="TextBox 75">
+            <a:extLst>
+              <a:ext uri="{FF2B5EF4-FFF2-40B4-BE49-F238E27FC236}">
+                <a16:creationId xmlns:a16="http://schemas.microsoft.com/office/drawing/2014/main" id="{F187D728-C219-A476-2AE4-2B4F66A5B882}"/>
+              </a:ext>
+            </a:extLst>
+          </p:cNvPr>
+          <p:cNvSpPr txBox="1"/>
+          <p:nvPr/>
+        </p:nvSpPr>
+        <p:spPr>
+          <a:xfrm>
+            <a:off x="6395798" y="4009799"/>
+            <a:ext cx="1169607" cy="307777"/>
+          </a:xfrm>
+          <a:prstGeom prst="rect">
+            <a:avLst/>
+          </a:prstGeom>
+          <a:ln>
+            <a:solidFill>
+              <a:srgbClr val="FF00A8"/>
+            </a:solidFill>
+          </a:ln>
+        </p:spPr>
+        <p:style>
+          <a:lnRef idx="2">
+            <a:schemeClr val="accent2"/>
+          </a:lnRef>
+          <a:fillRef idx="1">
+            <a:schemeClr val="lt1"/>
+          </a:fillRef>
+          <a:effectRef idx="0">
+            <a:schemeClr val="accent2"/>
+          </a:effectRef>
+          <a:fontRef idx="minor">
+            <a:schemeClr val="dk1"/>
+          </a:fontRef>
+        </p:style>
+        <p:txBody>
+          <a:bodyPr wrap="square" rtlCol="0">
+            <a:spAutoFit/>
+          </a:bodyPr>
+          <a:lstStyle/>
+          <a:p>
+            <a:pPr algn="ctr"/>
+            <a:r>
+              <a:rPr kumimoji="1" lang="ko-Kore-KR" altLang="en-US" sz="1400" dirty="0"/>
+              <a:t>데이터</a:t>
+            </a:r>
+            <a:r>
+              <a:rPr kumimoji="1" lang="ko-KR" altLang="en-US" sz="1400" dirty="0"/>
+              <a:t> 처리</a:t>
+            </a:r>
+            <a:endParaRPr kumimoji="1" lang="ko-Kore-KR" altLang="en-US" sz="1400" dirty="0"/>
+          </a:p>
+        </p:txBody>
+      </p:sp>
     </p:spTree>
     <p:extLst>
       <p:ext uri="{BB962C8B-B14F-4D97-AF65-F5344CB8AC3E}">
@@ -11329,6 +13494,816 @@
           <a:chExt cx="0" cy="0"/>
         </a:xfrm>
       </p:grpSpPr>
+      <p:sp>
+        <p:nvSpPr>
+          <p:cNvPr id="2" name="직사각형 1">
+            <a:extLst>
+              <a:ext uri="{FF2B5EF4-FFF2-40B4-BE49-F238E27FC236}">
+                <a16:creationId xmlns:a16="http://schemas.microsoft.com/office/drawing/2014/main" id="{F49D42EE-0934-77EE-30A3-254AA890C98C}"/>
+              </a:ext>
+            </a:extLst>
+          </p:cNvPr>
+          <p:cNvSpPr/>
+          <p:nvPr/>
+        </p:nvSpPr>
+        <p:spPr>
+          <a:xfrm>
+            <a:off x="1208690" y="1051034"/>
+            <a:ext cx="2144110" cy="662152"/>
+          </a:xfrm>
+          <a:prstGeom prst="rect">
+            <a:avLst/>
+          </a:prstGeom>
+        </p:spPr>
+        <p:style>
+          <a:lnRef idx="2">
+            <a:schemeClr val="accent1">
+              <a:shade val="50000"/>
+            </a:schemeClr>
+          </a:lnRef>
+          <a:fillRef idx="1">
+            <a:schemeClr val="accent1"/>
+          </a:fillRef>
+          <a:effectRef idx="0">
+            <a:schemeClr val="accent1"/>
+          </a:effectRef>
+          <a:fontRef idx="minor">
+            <a:schemeClr val="lt1"/>
+          </a:fontRef>
+        </p:style>
+        <p:txBody>
+          <a:bodyPr rtlCol="0" anchor="ctr"/>
+          <a:lstStyle/>
+          <a:p>
+            <a:pPr algn="ctr"/>
+            <a:r>
+              <a:rPr kumimoji="1" lang="en-US" altLang="ko-Kore-KR" dirty="0"/>
+              <a:t>board-app-client</a:t>
+            </a:r>
+            <a:endParaRPr kumimoji="1" lang="ko-Kore-KR" altLang="en-US" dirty="0"/>
+          </a:p>
+        </p:txBody>
+      </p:sp>
+      <p:sp>
+        <p:nvSpPr>
+          <p:cNvPr id="3" name="직사각형 2">
+            <a:extLst>
+              <a:ext uri="{FF2B5EF4-FFF2-40B4-BE49-F238E27FC236}">
+                <a16:creationId xmlns:a16="http://schemas.microsoft.com/office/drawing/2014/main" id="{7C8094F4-345D-1DF1-FF88-1323D1E83B3E}"/>
+              </a:ext>
+            </a:extLst>
+          </p:cNvPr>
+          <p:cNvSpPr/>
+          <p:nvPr/>
+        </p:nvSpPr>
+        <p:spPr>
+          <a:xfrm>
+            <a:off x="8518634" y="1051034"/>
+            <a:ext cx="2144110" cy="662152"/>
+          </a:xfrm>
+          <a:prstGeom prst="rect">
+            <a:avLst/>
+          </a:prstGeom>
+        </p:spPr>
+        <p:style>
+          <a:lnRef idx="2">
+            <a:schemeClr val="accent1">
+              <a:shade val="50000"/>
+            </a:schemeClr>
+          </a:lnRef>
+          <a:fillRef idx="1">
+            <a:schemeClr val="accent1"/>
+          </a:fillRef>
+          <a:effectRef idx="0">
+            <a:schemeClr val="accent1"/>
+          </a:effectRef>
+          <a:fontRef idx="minor">
+            <a:schemeClr val="lt1"/>
+          </a:fontRef>
+        </p:style>
+        <p:txBody>
+          <a:bodyPr rtlCol="0" anchor="ctr"/>
+          <a:lstStyle/>
+          <a:p>
+            <a:pPr algn="ctr"/>
+            <a:r>
+              <a:rPr kumimoji="1" lang="en-US" altLang="ko-Kore-KR" dirty="0"/>
+              <a:t>board-app-server</a:t>
+            </a:r>
+            <a:endParaRPr kumimoji="1" lang="ko-Kore-KR" altLang="en-US" dirty="0"/>
+          </a:p>
+        </p:txBody>
+      </p:sp>
+      <p:cxnSp>
+        <p:nvCxnSpPr>
+          <p:cNvPr id="5" name="직선 연결선[R] 4">
+            <a:extLst>
+              <a:ext uri="{FF2B5EF4-FFF2-40B4-BE49-F238E27FC236}">
+                <a16:creationId xmlns:a16="http://schemas.microsoft.com/office/drawing/2014/main" id="{CF91E900-66A8-A491-57E0-252056ED7833}"/>
+              </a:ext>
+            </a:extLst>
+          </p:cNvPr>
+          <p:cNvCxnSpPr>
+            <a:cxnSpLocks/>
+            <a:stCxn id="2" idx="2"/>
+          </p:cNvCxnSpPr>
+          <p:nvPr/>
+        </p:nvCxnSpPr>
+        <p:spPr>
+          <a:xfrm>
+            <a:off x="2280745" y="1713186"/>
+            <a:ext cx="0" cy="5144814"/>
+          </a:xfrm>
+          <a:prstGeom prst="line">
+            <a:avLst/>
+          </a:prstGeom>
+        </p:spPr>
+        <p:style>
+          <a:lnRef idx="3">
+            <a:schemeClr val="accent1"/>
+          </a:lnRef>
+          <a:fillRef idx="0">
+            <a:schemeClr val="accent1"/>
+          </a:fillRef>
+          <a:effectRef idx="2">
+            <a:schemeClr val="accent1"/>
+          </a:effectRef>
+          <a:fontRef idx="minor">
+            <a:schemeClr val="tx1"/>
+          </a:fontRef>
+        </p:style>
+      </p:cxnSp>
+      <p:cxnSp>
+        <p:nvCxnSpPr>
+          <p:cNvPr id="6" name="직선 연결선[R] 5">
+            <a:extLst>
+              <a:ext uri="{FF2B5EF4-FFF2-40B4-BE49-F238E27FC236}">
+                <a16:creationId xmlns:a16="http://schemas.microsoft.com/office/drawing/2014/main" id="{CBDC3412-4A1D-5253-97E0-F408F24B0CB0}"/>
+              </a:ext>
+            </a:extLst>
+          </p:cNvPr>
+          <p:cNvCxnSpPr>
+            <a:cxnSpLocks/>
+            <a:stCxn id="3" idx="2"/>
+          </p:cNvCxnSpPr>
+          <p:nvPr/>
+        </p:nvCxnSpPr>
+        <p:spPr>
+          <a:xfrm>
+            <a:off x="9590689" y="1713186"/>
+            <a:ext cx="0" cy="5144814"/>
+          </a:xfrm>
+          <a:prstGeom prst="line">
+            <a:avLst/>
+          </a:prstGeom>
+        </p:spPr>
+        <p:style>
+          <a:lnRef idx="3">
+            <a:schemeClr val="accent1"/>
+          </a:lnRef>
+          <a:fillRef idx="0">
+            <a:schemeClr val="accent1"/>
+          </a:fillRef>
+          <a:effectRef idx="2">
+            <a:schemeClr val="accent1"/>
+          </a:effectRef>
+          <a:fontRef idx="minor">
+            <a:schemeClr val="tx1"/>
+          </a:fontRef>
+        </p:style>
+      </p:cxnSp>
+      <p:cxnSp>
+        <p:nvCxnSpPr>
+          <p:cNvPr id="14" name="직선 화살표 연결선 13">
+            <a:extLst>
+              <a:ext uri="{FF2B5EF4-FFF2-40B4-BE49-F238E27FC236}">
+                <a16:creationId xmlns:a16="http://schemas.microsoft.com/office/drawing/2014/main" id="{EEA4A9E7-10A0-6F05-4E34-5E9C63BEF916}"/>
+              </a:ext>
+            </a:extLst>
+          </p:cNvPr>
+          <p:cNvCxnSpPr/>
+          <p:nvPr/>
+        </p:nvCxnSpPr>
+        <p:spPr>
+          <a:xfrm>
+            <a:off x="2280745" y="2417379"/>
+            <a:ext cx="7309944" cy="0"/>
+          </a:xfrm>
+          <a:prstGeom prst="straightConnector1">
+            <a:avLst/>
+          </a:prstGeom>
+          <a:ln>
+            <a:tailEnd type="triangle"/>
+          </a:ln>
+        </p:spPr>
+        <p:style>
+          <a:lnRef idx="3">
+            <a:schemeClr val="accent6"/>
+          </a:lnRef>
+          <a:fillRef idx="0">
+            <a:schemeClr val="accent6"/>
+          </a:fillRef>
+          <a:effectRef idx="2">
+            <a:schemeClr val="accent6"/>
+          </a:effectRef>
+          <a:fontRef idx="minor">
+            <a:schemeClr val="tx1"/>
+          </a:fontRef>
+        </p:style>
+      </p:cxnSp>
+      <p:cxnSp>
+        <p:nvCxnSpPr>
+          <p:cNvPr id="15" name="직선 화살표 연결선 14">
+            <a:extLst>
+              <a:ext uri="{FF2B5EF4-FFF2-40B4-BE49-F238E27FC236}">
+                <a16:creationId xmlns:a16="http://schemas.microsoft.com/office/drawing/2014/main" id="{3512CA29-4A88-E216-3F04-2EB8748D63F5}"/>
+              </a:ext>
+            </a:extLst>
+          </p:cNvPr>
+          <p:cNvCxnSpPr/>
+          <p:nvPr/>
+        </p:nvCxnSpPr>
+        <p:spPr>
+          <a:xfrm>
+            <a:off x="2280745" y="3242440"/>
+            <a:ext cx="7309944" cy="0"/>
+          </a:xfrm>
+          <a:prstGeom prst="straightConnector1">
+            <a:avLst/>
+          </a:prstGeom>
+          <a:ln>
+            <a:tailEnd type="triangle"/>
+          </a:ln>
+        </p:spPr>
+        <p:style>
+          <a:lnRef idx="3">
+            <a:schemeClr val="accent6"/>
+          </a:lnRef>
+          <a:fillRef idx="0">
+            <a:schemeClr val="accent6"/>
+          </a:fillRef>
+          <a:effectRef idx="2">
+            <a:schemeClr val="accent6"/>
+          </a:effectRef>
+          <a:fontRef idx="minor">
+            <a:schemeClr val="tx1"/>
+          </a:fontRef>
+        </p:style>
+      </p:cxnSp>
+      <p:cxnSp>
+        <p:nvCxnSpPr>
+          <p:cNvPr id="16" name="직선 화살표 연결선 15">
+            <a:extLst>
+              <a:ext uri="{FF2B5EF4-FFF2-40B4-BE49-F238E27FC236}">
+                <a16:creationId xmlns:a16="http://schemas.microsoft.com/office/drawing/2014/main" id="{3DEE58DB-0C7C-5FEA-9E4D-40AD3F899C95}"/>
+              </a:ext>
+            </a:extLst>
+          </p:cNvPr>
+          <p:cNvCxnSpPr/>
+          <p:nvPr/>
+        </p:nvCxnSpPr>
+        <p:spPr>
+          <a:xfrm>
+            <a:off x="2280745" y="4051738"/>
+            <a:ext cx="7309944" cy="0"/>
+          </a:xfrm>
+          <a:prstGeom prst="straightConnector1">
+            <a:avLst/>
+          </a:prstGeom>
+          <a:ln>
+            <a:tailEnd type="triangle"/>
+          </a:ln>
+        </p:spPr>
+        <p:style>
+          <a:lnRef idx="3">
+            <a:schemeClr val="accent6"/>
+          </a:lnRef>
+          <a:fillRef idx="0">
+            <a:schemeClr val="accent6"/>
+          </a:fillRef>
+          <a:effectRef idx="2">
+            <a:schemeClr val="accent6"/>
+          </a:effectRef>
+          <a:fontRef idx="minor">
+            <a:schemeClr val="tx1"/>
+          </a:fontRef>
+        </p:style>
+      </p:cxnSp>
+      <p:cxnSp>
+        <p:nvCxnSpPr>
+          <p:cNvPr id="18" name="직선 화살표 연결선 17">
+            <a:extLst>
+              <a:ext uri="{FF2B5EF4-FFF2-40B4-BE49-F238E27FC236}">
+                <a16:creationId xmlns:a16="http://schemas.microsoft.com/office/drawing/2014/main" id="{7A513F92-3D8E-91B2-5093-1DECD1EA6C73}"/>
+              </a:ext>
+            </a:extLst>
+          </p:cNvPr>
+          <p:cNvCxnSpPr/>
+          <p:nvPr/>
+        </p:nvCxnSpPr>
+        <p:spPr>
+          <a:xfrm flipH="1">
+            <a:off x="2280745" y="4855779"/>
+            <a:ext cx="7309944" cy="0"/>
+          </a:xfrm>
+          <a:prstGeom prst="straightConnector1">
+            <a:avLst/>
+          </a:prstGeom>
+          <a:ln>
+            <a:tailEnd type="triangle"/>
+          </a:ln>
+        </p:spPr>
+        <p:style>
+          <a:lnRef idx="3">
+            <a:schemeClr val="accent4"/>
+          </a:lnRef>
+          <a:fillRef idx="0">
+            <a:schemeClr val="accent4"/>
+          </a:fillRef>
+          <a:effectRef idx="2">
+            <a:schemeClr val="accent4"/>
+          </a:effectRef>
+          <a:fontRef idx="minor">
+            <a:schemeClr val="tx1"/>
+          </a:fontRef>
+        </p:style>
+      </p:cxnSp>
+      <p:cxnSp>
+        <p:nvCxnSpPr>
+          <p:cNvPr id="19" name="직선 화살표 연결선 18">
+            <a:extLst>
+              <a:ext uri="{FF2B5EF4-FFF2-40B4-BE49-F238E27FC236}">
+                <a16:creationId xmlns:a16="http://schemas.microsoft.com/office/drawing/2014/main" id="{CAB3DA83-937F-C5EC-384C-5B9071569E99}"/>
+              </a:ext>
+            </a:extLst>
+          </p:cNvPr>
+          <p:cNvCxnSpPr/>
+          <p:nvPr/>
+        </p:nvCxnSpPr>
+        <p:spPr>
+          <a:xfrm flipH="1">
+            <a:off x="2280745" y="5659820"/>
+            <a:ext cx="7309944" cy="0"/>
+          </a:xfrm>
+          <a:prstGeom prst="straightConnector1">
+            <a:avLst/>
+          </a:prstGeom>
+          <a:ln>
+            <a:tailEnd type="triangle"/>
+          </a:ln>
+        </p:spPr>
+        <p:style>
+          <a:lnRef idx="3">
+            <a:schemeClr val="accent4"/>
+          </a:lnRef>
+          <a:fillRef idx="0">
+            <a:schemeClr val="accent4"/>
+          </a:fillRef>
+          <a:effectRef idx="2">
+            <a:schemeClr val="accent4"/>
+          </a:effectRef>
+          <a:fontRef idx="minor">
+            <a:schemeClr val="tx1"/>
+          </a:fontRef>
+        </p:style>
+      </p:cxnSp>
+      <p:sp>
+        <p:nvSpPr>
+          <p:cNvPr id="20" name="TextBox 19">
+            <a:extLst>
+              <a:ext uri="{FF2B5EF4-FFF2-40B4-BE49-F238E27FC236}">
+                <a16:creationId xmlns:a16="http://schemas.microsoft.com/office/drawing/2014/main" id="{5E7CF8B2-0870-F448-E21F-B3FAE46FC3FE}"/>
+              </a:ext>
+            </a:extLst>
+          </p:cNvPr>
+          <p:cNvSpPr txBox="1"/>
+          <p:nvPr/>
+        </p:nvSpPr>
+        <p:spPr>
+          <a:xfrm>
+            <a:off x="6471415" y="2001871"/>
+            <a:ext cx="2924833" cy="307777"/>
+          </a:xfrm>
+          <a:prstGeom prst="rect">
+            <a:avLst/>
+          </a:prstGeom>
+        </p:spPr>
+        <p:style>
+          <a:lnRef idx="2">
+            <a:schemeClr val="accent6"/>
+          </a:lnRef>
+          <a:fillRef idx="1">
+            <a:schemeClr val="lt1"/>
+          </a:fillRef>
+          <a:effectRef idx="0">
+            <a:schemeClr val="accent6"/>
+          </a:effectRef>
+          <a:fontRef idx="minor">
+            <a:schemeClr val="dk1"/>
+          </a:fontRef>
+        </p:style>
+        <p:txBody>
+          <a:bodyPr wrap="square" rtlCol="0">
+            <a:spAutoFit/>
+          </a:bodyPr>
+          <a:lstStyle/>
+          <a:p>
+            <a:pPr algn="ctr"/>
+            <a:r>
+              <a:rPr kumimoji="1" lang="en-US" altLang="ko-Kore-KR" sz="1400" dirty="0"/>
+              <a:t>1. </a:t>
+            </a:r>
+            <a:r>
+              <a:rPr kumimoji="1" lang="ko-KR" altLang="en-US" sz="1400" dirty="0"/>
+              <a:t>데이터명</a:t>
+            </a:r>
+            <a:r>
+              <a:rPr kumimoji="1" lang="en-US" altLang="ko-KR" sz="1400" dirty="0"/>
+              <a:t>(</a:t>
+            </a:r>
+            <a:r>
+              <a:rPr kumimoji="1" lang="ko-KR" altLang="en-US" sz="1400" dirty="0"/>
+              <a:t>예</a:t>
+            </a:r>
+            <a:r>
+              <a:rPr kumimoji="1" lang="en-US" altLang="ko-KR" sz="1400" dirty="0"/>
+              <a:t>:</a:t>
+            </a:r>
+            <a:r>
+              <a:rPr kumimoji="1" lang="ko-KR" altLang="en-US" sz="1400" dirty="0"/>
+              <a:t> </a:t>
+            </a:r>
+            <a:r>
+              <a:rPr kumimoji="1" lang="en-US" altLang="ko-KR" sz="1400" dirty="0"/>
+              <a:t>board, member)</a:t>
+            </a:r>
+            <a:endParaRPr kumimoji="1" lang="ko-Kore-KR" altLang="en-US" sz="1400" dirty="0"/>
+          </a:p>
+        </p:txBody>
+      </p:sp>
+      <p:sp>
+        <p:nvSpPr>
+          <p:cNvPr id="21" name="TextBox 20">
+            <a:extLst>
+              <a:ext uri="{FF2B5EF4-FFF2-40B4-BE49-F238E27FC236}">
+                <a16:creationId xmlns:a16="http://schemas.microsoft.com/office/drawing/2014/main" id="{BB85A2B5-F6F2-8696-D212-CB8C1EB48C3E}"/>
+              </a:ext>
+            </a:extLst>
+          </p:cNvPr>
+          <p:cNvSpPr txBox="1"/>
+          <p:nvPr/>
+        </p:nvSpPr>
+        <p:spPr>
+          <a:xfrm>
+            <a:off x="4813743" y="2848303"/>
+            <a:ext cx="4582506" cy="307777"/>
+          </a:xfrm>
+          <a:prstGeom prst="rect">
+            <a:avLst/>
+          </a:prstGeom>
+        </p:spPr>
+        <p:style>
+          <a:lnRef idx="2">
+            <a:schemeClr val="accent6"/>
+          </a:lnRef>
+          <a:fillRef idx="1">
+            <a:schemeClr val="lt1"/>
+          </a:fillRef>
+          <a:effectRef idx="0">
+            <a:schemeClr val="accent6"/>
+          </a:effectRef>
+          <a:fontRef idx="minor">
+            <a:schemeClr val="dk1"/>
+          </a:fontRef>
+        </p:style>
+        <p:txBody>
+          <a:bodyPr wrap="square" rtlCol="0">
+            <a:spAutoFit/>
+          </a:bodyPr>
+          <a:lstStyle/>
+          <a:p>
+            <a:pPr algn="ctr"/>
+            <a:r>
+              <a:rPr kumimoji="1" lang="en-US" altLang="ko-Kore-KR" sz="1400" dirty="0"/>
+              <a:t>2. </a:t>
+            </a:r>
+            <a:r>
+              <a:rPr kumimoji="1" lang="ko-Kore-KR" altLang="en-US" sz="1400" dirty="0"/>
+              <a:t>명령</a:t>
+            </a:r>
+            <a:r>
+              <a:rPr kumimoji="1" lang="en-US" altLang="ko-KR" sz="1400" dirty="0"/>
+              <a:t>(</a:t>
+            </a:r>
+            <a:r>
+              <a:rPr kumimoji="1" lang="ko-KR" altLang="en-US" sz="1400" dirty="0"/>
+              <a:t>예</a:t>
+            </a:r>
+            <a:r>
+              <a:rPr kumimoji="1" lang="en-US" altLang="ko-KR" sz="1400" dirty="0"/>
+              <a:t>:</a:t>
+            </a:r>
+            <a:r>
+              <a:rPr kumimoji="1" lang="ko-KR" altLang="en-US" sz="1400" dirty="0"/>
+              <a:t> </a:t>
+            </a:r>
+            <a:r>
+              <a:rPr kumimoji="1" lang="en-US" altLang="ko-KR" sz="1400" dirty="0"/>
+              <a:t>insert, </a:t>
+            </a:r>
+            <a:r>
+              <a:rPr kumimoji="1" lang="en-US" altLang="ko-KR" sz="1400" dirty="0" err="1"/>
+              <a:t>findByNo</a:t>
+            </a:r>
+            <a:r>
+              <a:rPr kumimoji="1" lang="en-US" altLang="ko-KR" sz="1400" dirty="0"/>
+              <a:t>, </a:t>
+            </a:r>
+            <a:r>
+              <a:rPr kumimoji="1" lang="en-US" altLang="ko-KR" sz="1400" dirty="0" err="1"/>
+              <a:t>findAll</a:t>
+            </a:r>
+            <a:r>
+              <a:rPr kumimoji="1" lang="en-US" altLang="ko-KR" sz="1400" dirty="0"/>
+              <a:t>, delete, update)</a:t>
+            </a:r>
+            <a:endParaRPr kumimoji="1" lang="ko-Kore-KR" altLang="en-US" sz="1400" dirty="0"/>
+          </a:p>
+        </p:txBody>
+      </p:sp>
+      <p:sp>
+        <p:nvSpPr>
+          <p:cNvPr id="22" name="TextBox 21">
+            <a:extLst>
+              <a:ext uri="{FF2B5EF4-FFF2-40B4-BE49-F238E27FC236}">
+                <a16:creationId xmlns:a16="http://schemas.microsoft.com/office/drawing/2014/main" id="{0D40C2B1-A97F-8564-BCF4-E689FB0D99AA}"/>
+              </a:ext>
+            </a:extLst>
+          </p:cNvPr>
+          <p:cNvSpPr txBox="1"/>
+          <p:nvPr/>
+        </p:nvSpPr>
+        <p:spPr>
+          <a:xfrm>
+            <a:off x="8345216" y="3599792"/>
+            <a:ext cx="1051031" cy="307777"/>
+          </a:xfrm>
+          <a:prstGeom prst="rect">
+            <a:avLst/>
+          </a:prstGeom>
+        </p:spPr>
+        <p:style>
+          <a:lnRef idx="2">
+            <a:schemeClr val="accent6"/>
+          </a:lnRef>
+          <a:fillRef idx="1">
+            <a:schemeClr val="lt1"/>
+          </a:fillRef>
+          <a:effectRef idx="0">
+            <a:schemeClr val="accent6"/>
+          </a:effectRef>
+          <a:fontRef idx="minor">
+            <a:schemeClr val="dk1"/>
+          </a:fontRef>
+        </p:style>
+        <p:txBody>
+          <a:bodyPr wrap="square" rtlCol="0">
+            <a:spAutoFit/>
+          </a:bodyPr>
+          <a:lstStyle/>
+          <a:p>
+            <a:pPr algn="ctr"/>
+            <a:r>
+              <a:rPr kumimoji="1" lang="en-US" altLang="ko-Kore-KR" sz="1400" dirty="0"/>
+              <a:t>3. </a:t>
+            </a:r>
+            <a:r>
+              <a:rPr kumimoji="1" lang="ko-Kore-KR" altLang="en-US" sz="1400" dirty="0"/>
+              <a:t>데이터</a:t>
+            </a:r>
+          </a:p>
+        </p:txBody>
+      </p:sp>
+      <p:sp>
+        <p:nvSpPr>
+          <p:cNvPr id="23" name="TextBox 22">
+            <a:extLst>
+              <a:ext uri="{FF2B5EF4-FFF2-40B4-BE49-F238E27FC236}">
+                <a16:creationId xmlns:a16="http://schemas.microsoft.com/office/drawing/2014/main" id="{038C2DD5-E3A9-FE5A-838F-1CE67CF5E01A}"/>
+              </a:ext>
+            </a:extLst>
+          </p:cNvPr>
+          <p:cNvSpPr txBox="1"/>
+          <p:nvPr/>
+        </p:nvSpPr>
+        <p:spPr>
+          <a:xfrm>
+            <a:off x="2601310" y="4430457"/>
+            <a:ext cx="2924833" cy="307777"/>
+          </a:xfrm>
+          <a:prstGeom prst="rect">
+            <a:avLst/>
+          </a:prstGeom>
+        </p:spPr>
+        <p:style>
+          <a:lnRef idx="2">
+            <a:schemeClr val="accent2"/>
+          </a:lnRef>
+          <a:fillRef idx="1">
+            <a:schemeClr val="lt1"/>
+          </a:fillRef>
+          <a:effectRef idx="0">
+            <a:schemeClr val="accent2"/>
+          </a:effectRef>
+          <a:fontRef idx="minor">
+            <a:schemeClr val="dk1"/>
+          </a:fontRef>
+        </p:style>
+        <p:txBody>
+          <a:bodyPr wrap="square" rtlCol="0">
+            <a:spAutoFit/>
+          </a:bodyPr>
+          <a:lstStyle/>
+          <a:p>
+            <a:pPr algn="ctr"/>
+            <a:r>
+              <a:rPr kumimoji="1" lang="en-US" altLang="ko-KR" sz="1400" dirty="0"/>
+              <a:t>4.</a:t>
+            </a:r>
+            <a:r>
+              <a:rPr kumimoji="1" lang="ko-KR" altLang="en-US" sz="1400" dirty="0"/>
+              <a:t> 상태</a:t>
+            </a:r>
+            <a:r>
+              <a:rPr kumimoji="1" lang="en-US" altLang="ko-KR" sz="1400" dirty="0"/>
+              <a:t>(</a:t>
+            </a:r>
+            <a:r>
+              <a:rPr kumimoji="1" lang="ko-KR" altLang="en-US" sz="1400" dirty="0"/>
+              <a:t>예</a:t>
+            </a:r>
+            <a:r>
+              <a:rPr kumimoji="1" lang="en-US" altLang="ko-KR" sz="1400" dirty="0"/>
+              <a:t>:</a:t>
+            </a:r>
+            <a:r>
+              <a:rPr kumimoji="1" lang="ko-KR" altLang="en-US" sz="1400" dirty="0"/>
+              <a:t> </a:t>
+            </a:r>
+            <a:r>
+              <a:rPr kumimoji="1" lang="en-US" altLang="ko-KR" sz="1400" dirty="0"/>
+              <a:t>success, fail)</a:t>
+            </a:r>
+            <a:endParaRPr kumimoji="1" lang="ko-Kore-KR" altLang="en-US" sz="1400" dirty="0"/>
+          </a:p>
+        </p:txBody>
+      </p:sp>
+      <p:sp>
+        <p:nvSpPr>
+          <p:cNvPr id="24" name="TextBox 23">
+            <a:extLst>
+              <a:ext uri="{FF2B5EF4-FFF2-40B4-BE49-F238E27FC236}">
+                <a16:creationId xmlns:a16="http://schemas.microsoft.com/office/drawing/2014/main" id="{7E5EDC82-757C-6D45-B338-0EF7B292C3D1}"/>
+              </a:ext>
+            </a:extLst>
+          </p:cNvPr>
+          <p:cNvSpPr txBox="1"/>
+          <p:nvPr/>
+        </p:nvSpPr>
+        <p:spPr>
+          <a:xfrm>
+            <a:off x="2601310" y="5193945"/>
+            <a:ext cx="1255988" cy="307777"/>
+          </a:xfrm>
+          <a:prstGeom prst="rect">
+            <a:avLst/>
+          </a:prstGeom>
+        </p:spPr>
+        <p:style>
+          <a:lnRef idx="2">
+            <a:schemeClr val="accent2"/>
+          </a:lnRef>
+          <a:fillRef idx="1">
+            <a:schemeClr val="lt1"/>
+          </a:fillRef>
+          <a:effectRef idx="0">
+            <a:schemeClr val="accent2"/>
+          </a:effectRef>
+          <a:fontRef idx="minor">
+            <a:schemeClr val="dk1"/>
+          </a:fontRef>
+        </p:style>
+        <p:txBody>
+          <a:bodyPr wrap="square" rtlCol="0">
+            <a:spAutoFit/>
+          </a:bodyPr>
+          <a:lstStyle/>
+          <a:p>
+            <a:pPr algn="ctr"/>
+            <a:r>
+              <a:rPr kumimoji="1" lang="en-US" altLang="ko-KR" sz="1400" dirty="0"/>
+              <a:t>5.</a:t>
+            </a:r>
+            <a:r>
+              <a:rPr kumimoji="1" lang="ko-KR" altLang="en-US" sz="1400" dirty="0"/>
+              <a:t> 데이터</a:t>
+            </a:r>
+            <a:endParaRPr kumimoji="1" lang="ko-Kore-KR" altLang="en-US" sz="1400" dirty="0"/>
+          </a:p>
+        </p:txBody>
+      </p:sp>
+      <p:sp>
+        <p:nvSpPr>
+          <p:cNvPr id="25" name="직사각형 24">
+            <a:extLst>
+              <a:ext uri="{FF2B5EF4-FFF2-40B4-BE49-F238E27FC236}">
+                <a16:creationId xmlns:a16="http://schemas.microsoft.com/office/drawing/2014/main" id="{322D096D-BA46-6C49-87DE-B20937128759}"/>
+              </a:ext>
+            </a:extLst>
+          </p:cNvPr>
+          <p:cNvSpPr/>
+          <p:nvPr/>
+        </p:nvSpPr>
+        <p:spPr>
+          <a:xfrm>
+            <a:off x="10468302" y="3575004"/>
+            <a:ext cx="1208690" cy="665129"/>
+          </a:xfrm>
+          <a:prstGeom prst="rect">
+            <a:avLst/>
+          </a:prstGeom>
+        </p:spPr>
+        <p:style>
+          <a:lnRef idx="2">
+            <a:schemeClr val="accent1">
+              <a:shade val="50000"/>
+            </a:schemeClr>
+          </a:lnRef>
+          <a:fillRef idx="1">
+            <a:schemeClr val="accent1"/>
+          </a:fillRef>
+          <a:effectRef idx="0">
+            <a:schemeClr val="accent1"/>
+          </a:effectRef>
+          <a:fontRef idx="minor">
+            <a:schemeClr val="lt1"/>
+          </a:fontRef>
+        </p:style>
+        <p:txBody>
+          <a:bodyPr rtlCol="0" anchor="ctr"/>
+          <a:lstStyle/>
+          <a:p>
+            <a:pPr algn="ctr"/>
+            <a:r>
+              <a:rPr kumimoji="1" lang="en-US" altLang="ko-Kore-KR" dirty="0"/>
+              <a:t>List</a:t>
+            </a:r>
+            <a:endParaRPr kumimoji="1" lang="ko-Kore-KR" altLang="en-US" dirty="0"/>
+          </a:p>
+        </p:txBody>
+      </p:sp>
+      <p:cxnSp>
+        <p:nvCxnSpPr>
+          <p:cNvPr id="27" name="직선 화살표 연결선 26">
+            <a:extLst>
+              <a:ext uri="{FF2B5EF4-FFF2-40B4-BE49-F238E27FC236}">
+                <a16:creationId xmlns:a16="http://schemas.microsoft.com/office/drawing/2014/main" id="{1617C166-D039-94DD-4081-6876053CAE31}"/>
+              </a:ext>
+            </a:extLst>
+          </p:cNvPr>
+          <p:cNvCxnSpPr>
+            <a:cxnSpLocks/>
+            <a:endCxn id="25" idx="1"/>
+          </p:cNvCxnSpPr>
+          <p:nvPr/>
+        </p:nvCxnSpPr>
+        <p:spPr>
+          <a:xfrm>
+            <a:off x="9572293" y="3907569"/>
+            <a:ext cx="896009" cy="0"/>
+          </a:xfrm>
+          <a:prstGeom prst="straightConnector1">
+            <a:avLst/>
+          </a:prstGeom>
+          <a:ln>
+            <a:tailEnd type="triangle"/>
+          </a:ln>
+        </p:spPr>
+        <p:style>
+          <a:lnRef idx="3">
+            <a:schemeClr val="accent1"/>
+          </a:lnRef>
+          <a:fillRef idx="0">
+            <a:schemeClr val="accent1"/>
+          </a:fillRef>
+          <a:effectRef idx="2">
+            <a:schemeClr val="accent1"/>
+          </a:effectRef>
+          <a:fontRef idx="minor">
+            <a:schemeClr val="tx1"/>
+          </a:fontRef>
+        </p:style>
+      </p:cxnSp>
     </p:spTree>
     <p:extLst>
       <p:ext uri="{BB962C8B-B14F-4D97-AF65-F5344CB8AC3E}">

</xml_diff>